<commit_message>
- Movied omsi.workflow.analysis_driver.base to omsi.workflow.base and updated other modules accordingly - Added new analysis_task_set data structure to manage sets of analyses used to execute workflows - Added functionality to load workflows from workflow scripts
git-svn-id: https://code.lbl.gov/svn/openmsi-tk/trunk@501 770f0362-5d60-4208-80c3-892ab42ae3ed
</commit_message>
<xml_diff>
--- a/doc/_static/workflow_illustration.pptx
+++ b/doc/_static/workflow_illustration.pptx
@@ -7,6 +7,7 @@
   <p:sldIdLst>
     <p:sldId id="256" r:id="rId2"/>
     <p:sldId id="257" r:id="rId3"/>
+    <p:sldId id="258" r:id="rId4"/>
   </p:sldIdLst>
   <p:sldSz cx="10515600" cy="6858000"/>
   <p:notesSz cx="6858000" cy="9144000"/>
@@ -7468,6 +7469,2939 @@
     <p:extLst>
       <p:ext uri="{BB962C8B-B14F-4D97-AF65-F5344CB8AC3E}">
         <p14:creationId xmlns:p14="http://schemas.microsoft.com/office/powerpoint/2010/main" val="2625472539"/>
+      </p:ext>
+    </p:extLst>
+  </p:cSld>
+  <p:clrMapOvr>
+    <a:masterClrMapping/>
+  </p:clrMapOvr>
+  <p:timing>
+    <p:tnLst>
+      <p:par>
+        <p:cTn xmlns:p14="http://schemas.microsoft.com/office/powerpoint/2010/main" id="1" dur="indefinite" restart="never" nodeType="tmRoot"/>
+      </p:par>
+    </p:tnLst>
+  </p:timing>
+</p:sld>
+</file>
+
+<file path=ppt/slides/slide3.xml><?xml version="1.0" encoding="utf-8"?>
+<p:sld xmlns:a="http://schemas.openxmlformats.org/drawingml/2006/main" xmlns:r="http://schemas.openxmlformats.org/officeDocument/2006/relationships" xmlns:p="http://schemas.openxmlformats.org/presentationml/2006/main">
+  <p:cSld>
+    <p:spTree>
+      <p:nvGrpSpPr>
+        <p:cNvPr id="1" name=""/>
+        <p:cNvGrpSpPr/>
+        <p:nvPr/>
+      </p:nvGrpSpPr>
+      <p:grpSpPr>
+        <a:xfrm>
+          <a:off x="0" y="0"/>
+          <a:ext cx="0" cy="0"/>
+          <a:chOff x="0" y="0"/>
+          <a:chExt cx="0" cy="0"/>
+        </a:xfrm>
+      </p:grpSpPr>
+      <p:sp>
+        <p:nvSpPr>
+          <p:cNvPr id="86" name="Freeform 85"/>
+          <p:cNvSpPr/>
+          <p:nvPr/>
+        </p:nvSpPr>
+        <p:spPr>
+          <a:xfrm rot="10800000">
+            <a:off x="6584442" y="257467"/>
+            <a:ext cx="3780233" cy="5979916"/>
+          </a:xfrm>
+          <a:custGeom>
+            <a:avLst/>
+            <a:gdLst>
+              <a:gd name="connsiteX0" fmla="*/ 0 w 3666435"/>
+              <a:gd name="connsiteY0" fmla="*/ 22087 h 5985565"/>
+              <a:gd name="connsiteX1" fmla="*/ 0 w 3666435"/>
+              <a:gd name="connsiteY1" fmla="*/ 5985565 h 5985565"/>
+              <a:gd name="connsiteX2" fmla="*/ 3136348 w 3666435"/>
+              <a:gd name="connsiteY2" fmla="*/ 5952434 h 5985565"/>
+              <a:gd name="connsiteX3" fmla="*/ 3666435 w 3666435"/>
+              <a:gd name="connsiteY3" fmla="*/ 2937565 h 5985565"/>
+              <a:gd name="connsiteX4" fmla="*/ 3070087 w 3666435"/>
+              <a:gd name="connsiteY4" fmla="*/ 0 h 5985565"/>
+              <a:gd name="connsiteX5" fmla="*/ 0 w 3666435"/>
+              <a:gd name="connsiteY5" fmla="*/ 22087 h 5985565"/>
+              <a:gd name="connsiteX0" fmla="*/ 0 w 3688522"/>
+              <a:gd name="connsiteY0" fmla="*/ 0 h 6018696"/>
+              <a:gd name="connsiteX1" fmla="*/ 22087 w 3688522"/>
+              <a:gd name="connsiteY1" fmla="*/ 6018696 h 6018696"/>
+              <a:gd name="connsiteX2" fmla="*/ 3158435 w 3688522"/>
+              <a:gd name="connsiteY2" fmla="*/ 5985565 h 6018696"/>
+              <a:gd name="connsiteX3" fmla="*/ 3688522 w 3688522"/>
+              <a:gd name="connsiteY3" fmla="*/ 2970696 h 6018696"/>
+              <a:gd name="connsiteX4" fmla="*/ 3092174 w 3688522"/>
+              <a:gd name="connsiteY4" fmla="*/ 33131 h 6018696"/>
+              <a:gd name="connsiteX5" fmla="*/ 0 w 3688522"/>
+              <a:gd name="connsiteY5" fmla="*/ 0 h 6018696"/>
+              <a:gd name="connsiteX0" fmla="*/ 0 w 3688522"/>
+              <a:gd name="connsiteY0" fmla="*/ 11043 h 5985565"/>
+              <a:gd name="connsiteX1" fmla="*/ 22087 w 3688522"/>
+              <a:gd name="connsiteY1" fmla="*/ 5985565 h 5985565"/>
+              <a:gd name="connsiteX2" fmla="*/ 3158435 w 3688522"/>
+              <a:gd name="connsiteY2" fmla="*/ 5952434 h 5985565"/>
+              <a:gd name="connsiteX3" fmla="*/ 3688522 w 3688522"/>
+              <a:gd name="connsiteY3" fmla="*/ 2937565 h 5985565"/>
+              <a:gd name="connsiteX4" fmla="*/ 3092174 w 3688522"/>
+              <a:gd name="connsiteY4" fmla="*/ 0 h 5985565"/>
+              <a:gd name="connsiteX5" fmla="*/ 0 w 3688522"/>
+              <a:gd name="connsiteY5" fmla="*/ 11043 h 5985565"/>
+              <a:gd name="connsiteX0" fmla="*/ 0 w 3688522"/>
+              <a:gd name="connsiteY0" fmla="*/ 0 h 5996609"/>
+              <a:gd name="connsiteX1" fmla="*/ 22087 w 3688522"/>
+              <a:gd name="connsiteY1" fmla="*/ 5996609 h 5996609"/>
+              <a:gd name="connsiteX2" fmla="*/ 3158435 w 3688522"/>
+              <a:gd name="connsiteY2" fmla="*/ 5963478 h 5996609"/>
+              <a:gd name="connsiteX3" fmla="*/ 3688522 w 3688522"/>
+              <a:gd name="connsiteY3" fmla="*/ 2948609 h 5996609"/>
+              <a:gd name="connsiteX4" fmla="*/ 3092174 w 3688522"/>
+              <a:gd name="connsiteY4" fmla="*/ 11044 h 5996609"/>
+              <a:gd name="connsiteX5" fmla="*/ 0 w 3688522"/>
+              <a:gd name="connsiteY5" fmla="*/ 0 h 5996609"/>
+              <a:gd name="connsiteX0" fmla="*/ 0 w 3677478"/>
+              <a:gd name="connsiteY0" fmla="*/ 22086 h 5985565"/>
+              <a:gd name="connsiteX1" fmla="*/ 11043 w 3677478"/>
+              <a:gd name="connsiteY1" fmla="*/ 5985565 h 5985565"/>
+              <a:gd name="connsiteX2" fmla="*/ 3147391 w 3677478"/>
+              <a:gd name="connsiteY2" fmla="*/ 5952434 h 5985565"/>
+              <a:gd name="connsiteX3" fmla="*/ 3677478 w 3677478"/>
+              <a:gd name="connsiteY3" fmla="*/ 2937565 h 5985565"/>
+              <a:gd name="connsiteX4" fmla="*/ 3081130 w 3677478"/>
+              <a:gd name="connsiteY4" fmla="*/ 0 h 5985565"/>
+              <a:gd name="connsiteX5" fmla="*/ 0 w 3677478"/>
+              <a:gd name="connsiteY5" fmla="*/ 22086 h 5985565"/>
+              <a:gd name="connsiteX0" fmla="*/ 0 w 3677478"/>
+              <a:gd name="connsiteY0" fmla="*/ 0 h 5987107"/>
+              <a:gd name="connsiteX1" fmla="*/ 11043 w 3677478"/>
+              <a:gd name="connsiteY1" fmla="*/ 5987107 h 5987107"/>
+              <a:gd name="connsiteX2" fmla="*/ 3147391 w 3677478"/>
+              <a:gd name="connsiteY2" fmla="*/ 5953976 h 5987107"/>
+              <a:gd name="connsiteX3" fmla="*/ 3677478 w 3677478"/>
+              <a:gd name="connsiteY3" fmla="*/ 2939107 h 5987107"/>
+              <a:gd name="connsiteX4" fmla="*/ 3081130 w 3677478"/>
+              <a:gd name="connsiteY4" fmla="*/ 1542 h 5987107"/>
+              <a:gd name="connsiteX5" fmla="*/ 0 w 3677478"/>
+              <a:gd name="connsiteY5" fmla="*/ 0 h 5987107"/>
+              <a:gd name="connsiteX0" fmla="*/ 0 w 3677478"/>
+              <a:gd name="connsiteY0" fmla="*/ 0 h 5987107"/>
+              <a:gd name="connsiteX1" fmla="*/ 11043 w 3677478"/>
+              <a:gd name="connsiteY1" fmla="*/ 5987107 h 5987107"/>
+              <a:gd name="connsiteX2" fmla="*/ 3121452 w 3677478"/>
+              <a:gd name="connsiteY2" fmla="*/ 5979916 h 5987107"/>
+              <a:gd name="connsiteX3" fmla="*/ 3147391 w 3677478"/>
+              <a:gd name="connsiteY3" fmla="*/ 5953976 h 5987107"/>
+              <a:gd name="connsiteX4" fmla="*/ 3677478 w 3677478"/>
+              <a:gd name="connsiteY4" fmla="*/ 2939107 h 5987107"/>
+              <a:gd name="connsiteX5" fmla="*/ 3081130 w 3677478"/>
+              <a:gd name="connsiteY5" fmla="*/ 1542 h 5987107"/>
+              <a:gd name="connsiteX6" fmla="*/ 0 w 3677478"/>
+              <a:gd name="connsiteY6" fmla="*/ 0 h 5987107"/>
+              <a:gd name="connsiteX0" fmla="*/ 0 w 3411664"/>
+              <a:gd name="connsiteY0" fmla="*/ 0 h 5987107"/>
+              <a:gd name="connsiteX1" fmla="*/ 11043 w 3411664"/>
+              <a:gd name="connsiteY1" fmla="*/ 5987107 h 5987107"/>
+              <a:gd name="connsiteX2" fmla="*/ 3121452 w 3411664"/>
+              <a:gd name="connsiteY2" fmla="*/ 5979916 h 5987107"/>
+              <a:gd name="connsiteX3" fmla="*/ 3147391 w 3411664"/>
+              <a:gd name="connsiteY3" fmla="*/ 5953976 h 5987107"/>
+              <a:gd name="connsiteX4" fmla="*/ 3411664 w 3411664"/>
+              <a:gd name="connsiteY4" fmla="*/ 2980456 h 5987107"/>
+              <a:gd name="connsiteX5" fmla="*/ 3081130 w 3411664"/>
+              <a:gd name="connsiteY5" fmla="*/ 1542 h 5987107"/>
+              <a:gd name="connsiteX6" fmla="*/ 0 w 3411664"/>
+              <a:gd name="connsiteY6" fmla="*/ 0 h 5987107"/>
+              <a:gd name="connsiteX0" fmla="*/ 0 w 3771989"/>
+              <a:gd name="connsiteY0" fmla="*/ 0 h 5987107"/>
+              <a:gd name="connsiteX1" fmla="*/ 371368 w 3771989"/>
+              <a:gd name="connsiteY1" fmla="*/ 5987107 h 5987107"/>
+              <a:gd name="connsiteX2" fmla="*/ 3481777 w 3771989"/>
+              <a:gd name="connsiteY2" fmla="*/ 5979916 h 5987107"/>
+              <a:gd name="connsiteX3" fmla="*/ 3507716 w 3771989"/>
+              <a:gd name="connsiteY3" fmla="*/ 5953976 h 5987107"/>
+              <a:gd name="connsiteX4" fmla="*/ 3771989 w 3771989"/>
+              <a:gd name="connsiteY4" fmla="*/ 2980456 h 5987107"/>
+              <a:gd name="connsiteX5" fmla="*/ 3441455 w 3771989"/>
+              <a:gd name="connsiteY5" fmla="*/ 1542 h 5987107"/>
+              <a:gd name="connsiteX6" fmla="*/ 0 w 3771989"/>
+              <a:gd name="connsiteY6" fmla="*/ 0 h 5987107"/>
+              <a:gd name="connsiteX0" fmla="*/ 0 w 3771989"/>
+              <a:gd name="connsiteY0" fmla="*/ 0 h 5993014"/>
+              <a:gd name="connsiteX1" fmla="*/ 5136 w 3771989"/>
+              <a:gd name="connsiteY1" fmla="*/ 5993014 h 5993014"/>
+              <a:gd name="connsiteX2" fmla="*/ 3481777 w 3771989"/>
+              <a:gd name="connsiteY2" fmla="*/ 5979916 h 5993014"/>
+              <a:gd name="connsiteX3" fmla="*/ 3507716 w 3771989"/>
+              <a:gd name="connsiteY3" fmla="*/ 5953976 h 5993014"/>
+              <a:gd name="connsiteX4" fmla="*/ 3771989 w 3771989"/>
+              <a:gd name="connsiteY4" fmla="*/ 2980456 h 5993014"/>
+              <a:gd name="connsiteX5" fmla="*/ 3441455 w 3771989"/>
+              <a:gd name="connsiteY5" fmla="*/ 1542 h 5993014"/>
+              <a:gd name="connsiteX6" fmla="*/ 0 w 3771989"/>
+              <a:gd name="connsiteY6" fmla="*/ 0 h 5993014"/>
+              <a:gd name="connsiteX0" fmla="*/ 13857 w 3785846"/>
+              <a:gd name="connsiteY0" fmla="*/ 0 h 5979916"/>
+              <a:gd name="connsiteX1" fmla="*/ 1272 w 3785846"/>
+              <a:gd name="connsiteY1" fmla="*/ 5975293 h 5979916"/>
+              <a:gd name="connsiteX2" fmla="*/ 3495634 w 3785846"/>
+              <a:gd name="connsiteY2" fmla="*/ 5979916 h 5979916"/>
+              <a:gd name="connsiteX3" fmla="*/ 3521573 w 3785846"/>
+              <a:gd name="connsiteY3" fmla="*/ 5953976 h 5979916"/>
+              <a:gd name="connsiteX4" fmla="*/ 3785846 w 3785846"/>
+              <a:gd name="connsiteY4" fmla="*/ 2980456 h 5979916"/>
+              <a:gd name="connsiteX5" fmla="*/ 3455312 w 3785846"/>
+              <a:gd name="connsiteY5" fmla="*/ 1542 h 5979916"/>
+              <a:gd name="connsiteX6" fmla="*/ 13857 w 3785846"/>
+              <a:gd name="connsiteY6" fmla="*/ 0 h 5979916"/>
+              <a:gd name="connsiteX0" fmla="*/ 8244 w 3780233"/>
+              <a:gd name="connsiteY0" fmla="*/ 0 h 5979916"/>
+              <a:gd name="connsiteX1" fmla="*/ 1566 w 3780233"/>
+              <a:gd name="connsiteY1" fmla="*/ 5975293 h 5979916"/>
+              <a:gd name="connsiteX2" fmla="*/ 3490021 w 3780233"/>
+              <a:gd name="connsiteY2" fmla="*/ 5979916 h 5979916"/>
+              <a:gd name="connsiteX3" fmla="*/ 3515960 w 3780233"/>
+              <a:gd name="connsiteY3" fmla="*/ 5953976 h 5979916"/>
+              <a:gd name="connsiteX4" fmla="*/ 3780233 w 3780233"/>
+              <a:gd name="connsiteY4" fmla="*/ 2980456 h 5979916"/>
+              <a:gd name="connsiteX5" fmla="*/ 3449699 w 3780233"/>
+              <a:gd name="connsiteY5" fmla="*/ 1542 h 5979916"/>
+              <a:gd name="connsiteX6" fmla="*/ 8244 w 3780233"/>
+              <a:gd name="connsiteY6" fmla="*/ 0 h 5979916"/>
+            </a:gdLst>
+            <a:ahLst/>
+            <a:cxnLst>
+              <a:cxn ang="0">
+                <a:pos x="connsiteX0" y="connsiteY0"/>
+              </a:cxn>
+              <a:cxn ang="0">
+                <a:pos x="connsiteX1" y="connsiteY1"/>
+              </a:cxn>
+              <a:cxn ang="0">
+                <a:pos x="connsiteX2" y="connsiteY2"/>
+              </a:cxn>
+              <a:cxn ang="0">
+                <a:pos x="connsiteX3" y="connsiteY3"/>
+              </a:cxn>
+              <a:cxn ang="0">
+                <a:pos x="connsiteX4" y="connsiteY4"/>
+              </a:cxn>
+              <a:cxn ang="0">
+                <a:pos x="connsiteX5" y="connsiteY5"/>
+              </a:cxn>
+              <a:cxn ang="0">
+                <a:pos x="connsiteX6" y="connsiteY6"/>
+              </a:cxn>
+            </a:cxnLst>
+            <a:rect l="l" t="t" r="r" b="b"/>
+            <a:pathLst>
+              <a:path w="3780233" h="5979916">
+                <a:moveTo>
+                  <a:pt x="8244" y="0"/>
+                </a:moveTo>
+                <a:cubicBezTo>
+                  <a:pt x="15606" y="2006232"/>
+                  <a:pt x="-5796" y="3969061"/>
+                  <a:pt x="1566" y="5975293"/>
+                </a:cubicBezTo>
+                <a:lnTo>
+                  <a:pt x="3490021" y="5979916"/>
+                </a:lnTo>
+                <a:lnTo>
+                  <a:pt x="3515960" y="5953976"/>
+                </a:lnTo>
+                <a:lnTo>
+                  <a:pt x="3780233" y="2980456"/>
+                </a:lnTo>
+                <a:lnTo>
+                  <a:pt x="3449699" y="1542"/>
+                </a:lnTo>
+                <a:lnTo>
+                  <a:pt x="8244" y="0"/>
+                </a:lnTo>
+                <a:close/>
+              </a:path>
+            </a:pathLst>
+          </a:custGeom>
+          <a:solidFill>
+            <a:schemeClr val="accent3">
+              <a:lumMod val="40000"/>
+              <a:lumOff val="60000"/>
+            </a:schemeClr>
+          </a:solidFill>
+          <a:ln>
+            <a:solidFill>
+              <a:schemeClr val="tx1"/>
+            </a:solidFill>
+            <a:prstDash val="dash"/>
+          </a:ln>
+          <a:effectLst/>
+        </p:spPr>
+        <p:style>
+          <a:lnRef idx="1">
+            <a:schemeClr val="accent1"/>
+          </a:lnRef>
+          <a:fillRef idx="3">
+            <a:schemeClr val="accent1"/>
+          </a:fillRef>
+          <a:effectRef idx="2">
+            <a:schemeClr val="accent1"/>
+          </a:effectRef>
+          <a:fontRef idx="minor">
+            <a:schemeClr val="lt1"/>
+          </a:fontRef>
+        </p:style>
+        <p:txBody>
+          <a:bodyPr rtlCol="0" anchor="ctr"/>
+          <a:lstStyle/>
+          <a:p>
+            <a:pPr algn="ctr"/>
+            <a:endParaRPr lang="en-US"/>
+          </a:p>
+        </p:txBody>
+      </p:sp>
+      <p:sp>
+        <p:nvSpPr>
+          <p:cNvPr id="87" name="Freeform 86"/>
+          <p:cNvSpPr/>
+          <p:nvPr/>
+        </p:nvSpPr>
+        <p:spPr>
+          <a:xfrm>
+            <a:off x="3459873" y="256219"/>
+            <a:ext cx="3780233" cy="5979916"/>
+          </a:xfrm>
+          <a:custGeom>
+            <a:avLst/>
+            <a:gdLst>
+              <a:gd name="connsiteX0" fmla="*/ 0 w 3666435"/>
+              <a:gd name="connsiteY0" fmla="*/ 22087 h 5985565"/>
+              <a:gd name="connsiteX1" fmla="*/ 0 w 3666435"/>
+              <a:gd name="connsiteY1" fmla="*/ 5985565 h 5985565"/>
+              <a:gd name="connsiteX2" fmla="*/ 3136348 w 3666435"/>
+              <a:gd name="connsiteY2" fmla="*/ 5952434 h 5985565"/>
+              <a:gd name="connsiteX3" fmla="*/ 3666435 w 3666435"/>
+              <a:gd name="connsiteY3" fmla="*/ 2937565 h 5985565"/>
+              <a:gd name="connsiteX4" fmla="*/ 3070087 w 3666435"/>
+              <a:gd name="connsiteY4" fmla="*/ 0 h 5985565"/>
+              <a:gd name="connsiteX5" fmla="*/ 0 w 3666435"/>
+              <a:gd name="connsiteY5" fmla="*/ 22087 h 5985565"/>
+              <a:gd name="connsiteX0" fmla="*/ 0 w 3688522"/>
+              <a:gd name="connsiteY0" fmla="*/ 0 h 6018696"/>
+              <a:gd name="connsiteX1" fmla="*/ 22087 w 3688522"/>
+              <a:gd name="connsiteY1" fmla="*/ 6018696 h 6018696"/>
+              <a:gd name="connsiteX2" fmla="*/ 3158435 w 3688522"/>
+              <a:gd name="connsiteY2" fmla="*/ 5985565 h 6018696"/>
+              <a:gd name="connsiteX3" fmla="*/ 3688522 w 3688522"/>
+              <a:gd name="connsiteY3" fmla="*/ 2970696 h 6018696"/>
+              <a:gd name="connsiteX4" fmla="*/ 3092174 w 3688522"/>
+              <a:gd name="connsiteY4" fmla="*/ 33131 h 6018696"/>
+              <a:gd name="connsiteX5" fmla="*/ 0 w 3688522"/>
+              <a:gd name="connsiteY5" fmla="*/ 0 h 6018696"/>
+              <a:gd name="connsiteX0" fmla="*/ 0 w 3688522"/>
+              <a:gd name="connsiteY0" fmla="*/ 11043 h 5985565"/>
+              <a:gd name="connsiteX1" fmla="*/ 22087 w 3688522"/>
+              <a:gd name="connsiteY1" fmla="*/ 5985565 h 5985565"/>
+              <a:gd name="connsiteX2" fmla="*/ 3158435 w 3688522"/>
+              <a:gd name="connsiteY2" fmla="*/ 5952434 h 5985565"/>
+              <a:gd name="connsiteX3" fmla="*/ 3688522 w 3688522"/>
+              <a:gd name="connsiteY3" fmla="*/ 2937565 h 5985565"/>
+              <a:gd name="connsiteX4" fmla="*/ 3092174 w 3688522"/>
+              <a:gd name="connsiteY4" fmla="*/ 0 h 5985565"/>
+              <a:gd name="connsiteX5" fmla="*/ 0 w 3688522"/>
+              <a:gd name="connsiteY5" fmla="*/ 11043 h 5985565"/>
+              <a:gd name="connsiteX0" fmla="*/ 0 w 3688522"/>
+              <a:gd name="connsiteY0" fmla="*/ 0 h 5996609"/>
+              <a:gd name="connsiteX1" fmla="*/ 22087 w 3688522"/>
+              <a:gd name="connsiteY1" fmla="*/ 5996609 h 5996609"/>
+              <a:gd name="connsiteX2" fmla="*/ 3158435 w 3688522"/>
+              <a:gd name="connsiteY2" fmla="*/ 5963478 h 5996609"/>
+              <a:gd name="connsiteX3" fmla="*/ 3688522 w 3688522"/>
+              <a:gd name="connsiteY3" fmla="*/ 2948609 h 5996609"/>
+              <a:gd name="connsiteX4" fmla="*/ 3092174 w 3688522"/>
+              <a:gd name="connsiteY4" fmla="*/ 11044 h 5996609"/>
+              <a:gd name="connsiteX5" fmla="*/ 0 w 3688522"/>
+              <a:gd name="connsiteY5" fmla="*/ 0 h 5996609"/>
+              <a:gd name="connsiteX0" fmla="*/ 0 w 3677478"/>
+              <a:gd name="connsiteY0" fmla="*/ 22086 h 5985565"/>
+              <a:gd name="connsiteX1" fmla="*/ 11043 w 3677478"/>
+              <a:gd name="connsiteY1" fmla="*/ 5985565 h 5985565"/>
+              <a:gd name="connsiteX2" fmla="*/ 3147391 w 3677478"/>
+              <a:gd name="connsiteY2" fmla="*/ 5952434 h 5985565"/>
+              <a:gd name="connsiteX3" fmla="*/ 3677478 w 3677478"/>
+              <a:gd name="connsiteY3" fmla="*/ 2937565 h 5985565"/>
+              <a:gd name="connsiteX4" fmla="*/ 3081130 w 3677478"/>
+              <a:gd name="connsiteY4" fmla="*/ 0 h 5985565"/>
+              <a:gd name="connsiteX5" fmla="*/ 0 w 3677478"/>
+              <a:gd name="connsiteY5" fmla="*/ 22086 h 5985565"/>
+              <a:gd name="connsiteX0" fmla="*/ 0 w 3677478"/>
+              <a:gd name="connsiteY0" fmla="*/ 0 h 5987107"/>
+              <a:gd name="connsiteX1" fmla="*/ 11043 w 3677478"/>
+              <a:gd name="connsiteY1" fmla="*/ 5987107 h 5987107"/>
+              <a:gd name="connsiteX2" fmla="*/ 3147391 w 3677478"/>
+              <a:gd name="connsiteY2" fmla="*/ 5953976 h 5987107"/>
+              <a:gd name="connsiteX3" fmla="*/ 3677478 w 3677478"/>
+              <a:gd name="connsiteY3" fmla="*/ 2939107 h 5987107"/>
+              <a:gd name="connsiteX4" fmla="*/ 3081130 w 3677478"/>
+              <a:gd name="connsiteY4" fmla="*/ 1542 h 5987107"/>
+              <a:gd name="connsiteX5" fmla="*/ 0 w 3677478"/>
+              <a:gd name="connsiteY5" fmla="*/ 0 h 5987107"/>
+              <a:gd name="connsiteX0" fmla="*/ 0 w 3677478"/>
+              <a:gd name="connsiteY0" fmla="*/ 0 h 5987107"/>
+              <a:gd name="connsiteX1" fmla="*/ 11043 w 3677478"/>
+              <a:gd name="connsiteY1" fmla="*/ 5987107 h 5987107"/>
+              <a:gd name="connsiteX2" fmla="*/ 3121452 w 3677478"/>
+              <a:gd name="connsiteY2" fmla="*/ 5979916 h 5987107"/>
+              <a:gd name="connsiteX3" fmla="*/ 3147391 w 3677478"/>
+              <a:gd name="connsiteY3" fmla="*/ 5953976 h 5987107"/>
+              <a:gd name="connsiteX4" fmla="*/ 3677478 w 3677478"/>
+              <a:gd name="connsiteY4" fmla="*/ 2939107 h 5987107"/>
+              <a:gd name="connsiteX5" fmla="*/ 3081130 w 3677478"/>
+              <a:gd name="connsiteY5" fmla="*/ 1542 h 5987107"/>
+              <a:gd name="connsiteX6" fmla="*/ 0 w 3677478"/>
+              <a:gd name="connsiteY6" fmla="*/ 0 h 5987107"/>
+              <a:gd name="connsiteX0" fmla="*/ 0 w 3411664"/>
+              <a:gd name="connsiteY0" fmla="*/ 0 h 5987107"/>
+              <a:gd name="connsiteX1" fmla="*/ 11043 w 3411664"/>
+              <a:gd name="connsiteY1" fmla="*/ 5987107 h 5987107"/>
+              <a:gd name="connsiteX2" fmla="*/ 3121452 w 3411664"/>
+              <a:gd name="connsiteY2" fmla="*/ 5979916 h 5987107"/>
+              <a:gd name="connsiteX3" fmla="*/ 3147391 w 3411664"/>
+              <a:gd name="connsiteY3" fmla="*/ 5953976 h 5987107"/>
+              <a:gd name="connsiteX4" fmla="*/ 3411664 w 3411664"/>
+              <a:gd name="connsiteY4" fmla="*/ 2980456 h 5987107"/>
+              <a:gd name="connsiteX5" fmla="*/ 3081130 w 3411664"/>
+              <a:gd name="connsiteY5" fmla="*/ 1542 h 5987107"/>
+              <a:gd name="connsiteX6" fmla="*/ 0 w 3411664"/>
+              <a:gd name="connsiteY6" fmla="*/ 0 h 5987107"/>
+              <a:gd name="connsiteX0" fmla="*/ 0 w 3771989"/>
+              <a:gd name="connsiteY0" fmla="*/ 0 h 5987107"/>
+              <a:gd name="connsiteX1" fmla="*/ 371368 w 3771989"/>
+              <a:gd name="connsiteY1" fmla="*/ 5987107 h 5987107"/>
+              <a:gd name="connsiteX2" fmla="*/ 3481777 w 3771989"/>
+              <a:gd name="connsiteY2" fmla="*/ 5979916 h 5987107"/>
+              <a:gd name="connsiteX3" fmla="*/ 3507716 w 3771989"/>
+              <a:gd name="connsiteY3" fmla="*/ 5953976 h 5987107"/>
+              <a:gd name="connsiteX4" fmla="*/ 3771989 w 3771989"/>
+              <a:gd name="connsiteY4" fmla="*/ 2980456 h 5987107"/>
+              <a:gd name="connsiteX5" fmla="*/ 3441455 w 3771989"/>
+              <a:gd name="connsiteY5" fmla="*/ 1542 h 5987107"/>
+              <a:gd name="connsiteX6" fmla="*/ 0 w 3771989"/>
+              <a:gd name="connsiteY6" fmla="*/ 0 h 5987107"/>
+              <a:gd name="connsiteX0" fmla="*/ 0 w 3771989"/>
+              <a:gd name="connsiteY0" fmla="*/ 0 h 5993014"/>
+              <a:gd name="connsiteX1" fmla="*/ 5136 w 3771989"/>
+              <a:gd name="connsiteY1" fmla="*/ 5993014 h 5993014"/>
+              <a:gd name="connsiteX2" fmla="*/ 3481777 w 3771989"/>
+              <a:gd name="connsiteY2" fmla="*/ 5979916 h 5993014"/>
+              <a:gd name="connsiteX3" fmla="*/ 3507716 w 3771989"/>
+              <a:gd name="connsiteY3" fmla="*/ 5953976 h 5993014"/>
+              <a:gd name="connsiteX4" fmla="*/ 3771989 w 3771989"/>
+              <a:gd name="connsiteY4" fmla="*/ 2980456 h 5993014"/>
+              <a:gd name="connsiteX5" fmla="*/ 3441455 w 3771989"/>
+              <a:gd name="connsiteY5" fmla="*/ 1542 h 5993014"/>
+              <a:gd name="connsiteX6" fmla="*/ 0 w 3771989"/>
+              <a:gd name="connsiteY6" fmla="*/ 0 h 5993014"/>
+              <a:gd name="connsiteX0" fmla="*/ 13857 w 3785846"/>
+              <a:gd name="connsiteY0" fmla="*/ 0 h 5979916"/>
+              <a:gd name="connsiteX1" fmla="*/ 1272 w 3785846"/>
+              <a:gd name="connsiteY1" fmla="*/ 5975293 h 5979916"/>
+              <a:gd name="connsiteX2" fmla="*/ 3495634 w 3785846"/>
+              <a:gd name="connsiteY2" fmla="*/ 5979916 h 5979916"/>
+              <a:gd name="connsiteX3" fmla="*/ 3521573 w 3785846"/>
+              <a:gd name="connsiteY3" fmla="*/ 5953976 h 5979916"/>
+              <a:gd name="connsiteX4" fmla="*/ 3785846 w 3785846"/>
+              <a:gd name="connsiteY4" fmla="*/ 2980456 h 5979916"/>
+              <a:gd name="connsiteX5" fmla="*/ 3455312 w 3785846"/>
+              <a:gd name="connsiteY5" fmla="*/ 1542 h 5979916"/>
+              <a:gd name="connsiteX6" fmla="*/ 13857 w 3785846"/>
+              <a:gd name="connsiteY6" fmla="*/ 0 h 5979916"/>
+              <a:gd name="connsiteX0" fmla="*/ 8244 w 3780233"/>
+              <a:gd name="connsiteY0" fmla="*/ 0 h 5979916"/>
+              <a:gd name="connsiteX1" fmla="*/ 1566 w 3780233"/>
+              <a:gd name="connsiteY1" fmla="*/ 5975293 h 5979916"/>
+              <a:gd name="connsiteX2" fmla="*/ 3490021 w 3780233"/>
+              <a:gd name="connsiteY2" fmla="*/ 5979916 h 5979916"/>
+              <a:gd name="connsiteX3" fmla="*/ 3515960 w 3780233"/>
+              <a:gd name="connsiteY3" fmla="*/ 5953976 h 5979916"/>
+              <a:gd name="connsiteX4" fmla="*/ 3780233 w 3780233"/>
+              <a:gd name="connsiteY4" fmla="*/ 2980456 h 5979916"/>
+              <a:gd name="connsiteX5" fmla="*/ 3449699 w 3780233"/>
+              <a:gd name="connsiteY5" fmla="*/ 1542 h 5979916"/>
+              <a:gd name="connsiteX6" fmla="*/ 8244 w 3780233"/>
+              <a:gd name="connsiteY6" fmla="*/ 0 h 5979916"/>
+            </a:gdLst>
+            <a:ahLst/>
+            <a:cxnLst>
+              <a:cxn ang="0">
+                <a:pos x="connsiteX0" y="connsiteY0"/>
+              </a:cxn>
+              <a:cxn ang="0">
+                <a:pos x="connsiteX1" y="connsiteY1"/>
+              </a:cxn>
+              <a:cxn ang="0">
+                <a:pos x="connsiteX2" y="connsiteY2"/>
+              </a:cxn>
+              <a:cxn ang="0">
+                <a:pos x="connsiteX3" y="connsiteY3"/>
+              </a:cxn>
+              <a:cxn ang="0">
+                <a:pos x="connsiteX4" y="connsiteY4"/>
+              </a:cxn>
+              <a:cxn ang="0">
+                <a:pos x="connsiteX5" y="connsiteY5"/>
+              </a:cxn>
+              <a:cxn ang="0">
+                <a:pos x="connsiteX6" y="connsiteY6"/>
+              </a:cxn>
+            </a:cxnLst>
+            <a:rect l="l" t="t" r="r" b="b"/>
+            <a:pathLst>
+              <a:path w="3780233" h="5979916">
+                <a:moveTo>
+                  <a:pt x="8244" y="0"/>
+                </a:moveTo>
+                <a:cubicBezTo>
+                  <a:pt x="15606" y="2006232"/>
+                  <a:pt x="-5796" y="3969061"/>
+                  <a:pt x="1566" y="5975293"/>
+                </a:cubicBezTo>
+                <a:lnTo>
+                  <a:pt x="3490021" y="5979916"/>
+                </a:lnTo>
+                <a:lnTo>
+                  <a:pt x="3515960" y="5953976"/>
+                </a:lnTo>
+                <a:lnTo>
+                  <a:pt x="3780233" y="2980456"/>
+                </a:lnTo>
+                <a:lnTo>
+                  <a:pt x="3449699" y="1542"/>
+                </a:lnTo>
+                <a:lnTo>
+                  <a:pt x="8244" y="0"/>
+                </a:lnTo>
+                <a:close/>
+              </a:path>
+            </a:pathLst>
+          </a:custGeom>
+          <a:solidFill>
+            <a:schemeClr val="accent2">
+              <a:lumMod val="40000"/>
+              <a:lumOff val="60000"/>
+            </a:schemeClr>
+          </a:solidFill>
+          <a:ln>
+            <a:solidFill>
+              <a:srgbClr val="000000"/>
+            </a:solidFill>
+            <a:prstDash val="dash"/>
+          </a:ln>
+          <a:effectLst/>
+        </p:spPr>
+        <p:style>
+          <a:lnRef idx="1">
+            <a:schemeClr val="accent1"/>
+          </a:lnRef>
+          <a:fillRef idx="3">
+            <a:schemeClr val="accent1"/>
+          </a:fillRef>
+          <a:effectRef idx="2">
+            <a:schemeClr val="accent1"/>
+          </a:effectRef>
+          <a:fontRef idx="minor">
+            <a:schemeClr val="lt1"/>
+          </a:fontRef>
+        </p:style>
+        <p:txBody>
+          <a:bodyPr rtlCol="0" anchor="ctr"/>
+          <a:lstStyle/>
+          <a:p>
+            <a:pPr algn="ctr"/>
+            <a:endParaRPr lang="en-US"/>
+          </a:p>
+        </p:txBody>
+      </p:sp>
+      <p:sp>
+        <p:nvSpPr>
+          <p:cNvPr id="88" name="Freeform 87"/>
+          <p:cNvSpPr/>
+          <p:nvPr/>
+        </p:nvSpPr>
+        <p:spPr>
+          <a:xfrm>
+            <a:off x="236178" y="257761"/>
+            <a:ext cx="3658852" cy="5995042"/>
+          </a:xfrm>
+          <a:custGeom>
+            <a:avLst/>
+            <a:gdLst>
+              <a:gd name="connsiteX0" fmla="*/ 0 w 3666435"/>
+              <a:gd name="connsiteY0" fmla="*/ 22087 h 5985565"/>
+              <a:gd name="connsiteX1" fmla="*/ 0 w 3666435"/>
+              <a:gd name="connsiteY1" fmla="*/ 5985565 h 5985565"/>
+              <a:gd name="connsiteX2" fmla="*/ 3136348 w 3666435"/>
+              <a:gd name="connsiteY2" fmla="*/ 5952434 h 5985565"/>
+              <a:gd name="connsiteX3" fmla="*/ 3666435 w 3666435"/>
+              <a:gd name="connsiteY3" fmla="*/ 2937565 h 5985565"/>
+              <a:gd name="connsiteX4" fmla="*/ 3070087 w 3666435"/>
+              <a:gd name="connsiteY4" fmla="*/ 0 h 5985565"/>
+              <a:gd name="connsiteX5" fmla="*/ 0 w 3666435"/>
+              <a:gd name="connsiteY5" fmla="*/ 22087 h 5985565"/>
+              <a:gd name="connsiteX0" fmla="*/ 0 w 3688522"/>
+              <a:gd name="connsiteY0" fmla="*/ 0 h 6018696"/>
+              <a:gd name="connsiteX1" fmla="*/ 22087 w 3688522"/>
+              <a:gd name="connsiteY1" fmla="*/ 6018696 h 6018696"/>
+              <a:gd name="connsiteX2" fmla="*/ 3158435 w 3688522"/>
+              <a:gd name="connsiteY2" fmla="*/ 5985565 h 6018696"/>
+              <a:gd name="connsiteX3" fmla="*/ 3688522 w 3688522"/>
+              <a:gd name="connsiteY3" fmla="*/ 2970696 h 6018696"/>
+              <a:gd name="connsiteX4" fmla="*/ 3092174 w 3688522"/>
+              <a:gd name="connsiteY4" fmla="*/ 33131 h 6018696"/>
+              <a:gd name="connsiteX5" fmla="*/ 0 w 3688522"/>
+              <a:gd name="connsiteY5" fmla="*/ 0 h 6018696"/>
+              <a:gd name="connsiteX0" fmla="*/ 0 w 3688522"/>
+              <a:gd name="connsiteY0" fmla="*/ 11043 h 5985565"/>
+              <a:gd name="connsiteX1" fmla="*/ 22087 w 3688522"/>
+              <a:gd name="connsiteY1" fmla="*/ 5985565 h 5985565"/>
+              <a:gd name="connsiteX2" fmla="*/ 3158435 w 3688522"/>
+              <a:gd name="connsiteY2" fmla="*/ 5952434 h 5985565"/>
+              <a:gd name="connsiteX3" fmla="*/ 3688522 w 3688522"/>
+              <a:gd name="connsiteY3" fmla="*/ 2937565 h 5985565"/>
+              <a:gd name="connsiteX4" fmla="*/ 3092174 w 3688522"/>
+              <a:gd name="connsiteY4" fmla="*/ 0 h 5985565"/>
+              <a:gd name="connsiteX5" fmla="*/ 0 w 3688522"/>
+              <a:gd name="connsiteY5" fmla="*/ 11043 h 5985565"/>
+              <a:gd name="connsiteX0" fmla="*/ 0 w 3688522"/>
+              <a:gd name="connsiteY0" fmla="*/ 0 h 5996609"/>
+              <a:gd name="connsiteX1" fmla="*/ 22087 w 3688522"/>
+              <a:gd name="connsiteY1" fmla="*/ 5996609 h 5996609"/>
+              <a:gd name="connsiteX2" fmla="*/ 3158435 w 3688522"/>
+              <a:gd name="connsiteY2" fmla="*/ 5963478 h 5996609"/>
+              <a:gd name="connsiteX3" fmla="*/ 3688522 w 3688522"/>
+              <a:gd name="connsiteY3" fmla="*/ 2948609 h 5996609"/>
+              <a:gd name="connsiteX4" fmla="*/ 3092174 w 3688522"/>
+              <a:gd name="connsiteY4" fmla="*/ 11044 h 5996609"/>
+              <a:gd name="connsiteX5" fmla="*/ 0 w 3688522"/>
+              <a:gd name="connsiteY5" fmla="*/ 0 h 5996609"/>
+              <a:gd name="connsiteX0" fmla="*/ 0 w 3677478"/>
+              <a:gd name="connsiteY0" fmla="*/ 22086 h 5985565"/>
+              <a:gd name="connsiteX1" fmla="*/ 11043 w 3677478"/>
+              <a:gd name="connsiteY1" fmla="*/ 5985565 h 5985565"/>
+              <a:gd name="connsiteX2" fmla="*/ 3147391 w 3677478"/>
+              <a:gd name="connsiteY2" fmla="*/ 5952434 h 5985565"/>
+              <a:gd name="connsiteX3" fmla="*/ 3677478 w 3677478"/>
+              <a:gd name="connsiteY3" fmla="*/ 2937565 h 5985565"/>
+              <a:gd name="connsiteX4" fmla="*/ 3081130 w 3677478"/>
+              <a:gd name="connsiteY4" fmla="*/ 0 h 5985565"/>
+              <a:gd name="connsiteX5" fmla="*/ 0 w 3677478"/>
+              <a:gd name="connsiteY5" fmla="*/ 22086 h 5985565"/>
+              <a:gd name="connsiteX0" fmla="*/ 0 w 3677478"/>
+              <a:gd name="connsiteY0" fmla="*/ 0 h 5987107"/>
+              <a:gd name="connsiteX1" fmla="*/ 11043 w 3677478"/>
+              <a:gd name="connsiteY1" fmla="*/ 5987107 h 5987107"/>
+              <a:gd name="connsiteX2" fmla="*/ 3147391 w 3677478"/>
+              <a:gd name="connsiteY2" fmla="*/ 5953976 h 5987107"/>
+              <a:gd name="connsiteX3" fmla="*/ 3677478 w 3677478"/>
+              <a:gd name="connsiteY3" fmla="*/ 2939107 h 5987107"/>
+              <a:gd name="connsiteX4" fmla="*/ 3081130 w 3677478"/>
+              <a:gd name="connsiteY4" fmla="*/ 1542 h 5987107"/>
+              <a:gd name="connsiteX5" fmla="*/ 0 w 3677478"/>
+              <a:gd name="connsiteY5" fmla="*/ 0 h 5987107"/>
+              <a:gd name="connsiteX0" fmla="*/ 0 w 3677478"/>
+              <a:gd name="connsiteY0" fmla="*/ 0 h 5987107"/>
+              <a:gd name="connsiteX1" fmla="*/ 11043 w 3677478"/>
+              <a:gd name="connsiteY1" fmla="*/ 5987107 h 5987107"/>
+              <a:gd name="connsiteX2" fmla="*/ 3121452 w 3677478"/>
+              <a:gd name="connsiteY2" fmla="*/ 5979916 h 5987107"/>
+              <a:gd name="connsiteX3" fmla="*/ 3147391 w 3677478"/>
+              <a:gd name="connsiteY3" fmla="*/ 5953976 h 5987107"/>
+              <a:gd name="connsiteX4" fmla="*/ 3677478 w 3677478"/>
+              <a:gd name="connsiteY4" fmla="*/ 2939107 h 5987107"/>
+              <a:gd name="connsiteX5" fmla="*/ 3081130 w 3677478"/>
+              <a:gd name="connsiteY5" fmla="*/ 1542 h 5987107"/>
+              <a:gd name="connsiteX6" fmla="*/ 0 w 3677478"/>
+              <a:gd name="connsiteY6" fmla="*/ 0 h 5987107"/>
+              <a:gd name="connsiteX0" fmla="*/ 0 w 3411664"/>
+              <a:gd name="connsiteY0" fmla="*/ 0 h 5987107"/>
+              <a:gd name="connsiteX1" fmla="*/ 11043 w 3411664"/>
+              <a:gd name="connsiteY1" fmla="*/ 5987107 h 5987107"/>
+              <a:gd name="connsiteX2" fmla="*/ 3121452 w 3411664"/>
+              <a:gd name="connsiteY2" fmla="*/ 5979916 h 5987107"/>
+              <a:gd name="connsiteX3" fmla="*/ 3147391 w 3411664"/>
+              <a:gd name="connsiteY3" fmla="*/ 5953976 h 5987107"/>
+              <a:gd name="connsiteX4" fmla="*/ 3411664 w 3411664"/>
+              <a:gd name="connsiteY4" fmla="*/ 2980456 h 5987107"/>
+              <a:gd name="connsiteX5" fmla="*/ 3081130 w 3411664"/>
+              <a:gd name="connsiteY5" fmla="*/ 1542 h 5987107"/>
+              <a:gd name="connsiteX6" fmla="*/ 0 w 3411664"/>
+              <a:gd name="connsiteY6" fmla="*/ 0 h 5987107"/>
+              <a:gd name="connsiteX0" fmla="*/ 245019 w 3656683"/>
+              <a:gd name="connsiteY0" fmla="*/ 0 h 5996584"/>
+              <a:gd name="connsiteX1" fmla="*/ 153 w 3656683"/>
+              <a:gd name="connsiteY1" fmla="*/ 5996584 h 5996584"/>
+              <a:gd name="connsiteX2" fmla="*/ 3366471 w 3656683"/>
+              <a:gd name="connsiteY2" fmla="*/ 5979916 h 5996584"/>
+              <a:gd name="connsiteX3" fmla="*/ 3392410 w 3656683"/>
+              <a:gd name="connsiteY3" fmla="*/ 5953976 h 5996584"/>
+              <a:gd name="connsiteX4" fmla="*/ 3656683 w 3656683"/>
+              <a:gd name="connsiteY4" fmla="*/ 2980456 h 5996584"/>
+              <a:gd name="connsiteX5" fmla="*/ 3326149 w 3656683"/>
+              <a:gd name="connsiteY5" fmla="*/ 1542 h 5996584"/>
+              <a:gd name="connsiteX6" fmla="*/ 245019 w 3656683"/>
+              <a:gd name="connsiteY6" fmla="*/ 0 h 5996584"/>
+              <a:gd name="connsiteX0" fmla="*/ 9407 w 3658023"/>
+              <a:gd name="connsiteY0" fmla="*/ 64799 h 5995042"/>
+              <a:gd name="connsiteX1" fmla="*/ 1493 w 3658023"/>
+              <a:gd name="connsiteY1" fmla="*/ 5995042 h 5995042"/>
+              <a:gd name="connsiteX2" fmla="*/ 3367811 w 3658023"/>
+              <a:gd name="connsiteY2" fmla="*/ 5978374 h 5995042"/>
+              <a:gd name="connsiteX3" fmla="*/ 3393750 w 3658023"/>
+              <a:gd name="connsiteY3" fmla="*/ 5952434 h 5995042"/>
+              <a:gd name="connsiteX4" fmla="*/ 3658023 w 3658023"/>
+              <a:gd name="connsiteY4" fmla="*/ 2978914 h 5995042"/>
+              <a:gd name="connsiteX5" fmla="*/ 3327489 w 3658023"/>
+              <a:gd name="connsiteY5" fmla="*/ 0 h 5995042"/>
+              <a:gd name="connsiteX6" fmla="*/ 9407 w 3658023"/>
+              <a:gd name="connsiteY6" fmla="*/ 64799 h 5995042"/>
+              <a:gd name="connsiteX0" fmla="*/ 758 w 3658852"/>
+              <a:gd name="connsiteY0" fmla="*/ 7935 h 5995042"/>
+              <a:gd name="connsiteX1" fmla="*/ 2322 w 3658852"/>
+              <a:gd name="connsiteY1" fmla="*/ 5995042 h 5995042"/>
+              <a:gd name="connsiteX2" fmla="*/ 3368640 w 3658852"/>
+              <a:gd name="connsiteY2" fmla="*/ 5978374 h 5995042"/>
+              <a:gd name="connsiteX3" fmla="*/ 3394579 w 3658852"/>
+              <a:gd name="connsiteY3" fmla="*/ 5952434 h 5995042"/>
+              <a:gd name="connsiteX4" fmla="*/ 3658852 w 3658852"/>
+              <a:gd name="connsiteY4" fmla="*/ 2978914 h 5995042"/>
+              <a:gd name="connsiteX5" fmla="*/ 3328318 w 3658852"/>
+              <a:gd name="connsiteY5" fmla="*/ 0 h 5995042"/>
+              <a:gd name="connsiteX6" fmla="*/ 758 w 3658852"/>
+              <a:gd name="connsiteY6" fmla="*/ 7935 h 5995042"/>
+            </a:gdLst>
+            <a:ahLst/>
+            <a:cxnLst>
+              <a:cxn ang="0">
+                <a:pos x="connsiteX0" y="connsiteY0"/>
+              </a:cxn>
+              <a:cxn ang="0">
+                <a:pos x="connsiteX1" y="connsiteY1"/>
+              </a:cxn>
+              <a:cxn ang="0">
+                <a:pos x="connsiteX2" y="connsiteY2"/>
+              </a:cxn>
+              <a:cxn ang="0">
+                <a:pos x="connsiteX3" y="connsiteY3"/>
+              </a:cxn>
+              <a:cxn ang="0">
+                <a:pos x="connsiteX4" y="connsiteY4"/>
+              </a:cxn>
+              <a:cxn ang="0">
+                <a:pos x="connsiteX5" y="connsiteY5"/>
+              </a:cxn>
+              <a:cxn ang="0">
+                <a:pos x="connsiteX6" y="connsiteY6"/>
+              </a:cxn>
+            </a:cxnLst>
+            <a:rect l="l" t="t" r="r" b="b"/>
+            <a:pathLst>
+              <a:path w="3658852" h="5995042">
+                <a:moveTo>
+                  <a:pt x="758" y="7935"/>
+                </a:moveTo>
+                <a:cubicBezTo>
+                  <a:pt x="8120" y="2014167"/>
+                  <a:pt x="-5040" y="3988810"/>
+                  <a:pt x="2322" y="5995042"/>
+                </a:cubicBezTo>
+                <a:lnTo>
+                  <a:pt x="3368640" y="5978374"/>
+                </a:lnTo>
+                <a:lnTo>
+                  <a:pt x="3394579" y="5952434"/>
+                </a:lnTo>
+                <a:lnTo>
+                  <a:pt x="3658852" y="2978914"/>
+                </a:lnTo>
+                <a:lnTo>
+                  <a:pt x="3328318" y="0"/>
+                </a:lnTo>
+                <a:lnTo>
+                  <a:pt x="758" y="7935"/>
+                </a:lnTo>
+                <a:close/>
+              </a:path>
+            </a:pathLst>
+          </a:custGeom>
+          <a:solidFill>
+            <a:schemeClr val="accent1">
+              <a:lumMod val="40000"/>
+              <a:lumOff val="60000"/>
+            </a:schemeClr>
+          </a:solidFill>
+          <a:ln>
+            <a:solidFill>
+              <a:schemeClr val="tx1"/>
+            </a:solidFill>
+            <a:prstDash val="dash"/>
+          </a:ln>
+          <a:effectLst/>
+        </p:spPr>
+        <p:style>
+          <a:lnRef idx="1">
+            <a:schemeClr val="accent1"/>
+          </a:lnRef>
+          <a:fillRef idx="3">
+            <a:schemeClr val="accent1"/>
+          </a:fillRef>
+          <a:effectRef idx="2">
+            <a:schemeClr val="accent1"/>
+          </a:effectRef>
+          <a:fontRef idx="minor">
+            <a:schemeClr val="lt1"/>
+          </a:fontRef>
+        </p:style>
+        <p:txBody>
+          <a:bodyPr rtlCol="0" anchor="ctr"/>
+          <a:lstStyle/>
+          <a:p>
+            <a:pPr algn="ctr"/>
+            <a:endParaRPr lang="en-US"/>
+          </a:p>
+        </p:txBody>
+      </p:sp>
+      <p:sp>
+        <p:nvSpPr>
+          <p:cNvPr id="89" name="Rectangle 88"/>
+          <p:cNvSpPr/>
+          <p:nvPr/>
+        </p:nvSpPr>
+        <p:spPr>
+          <a:xfrm>
+            <a:off x="4831421" y="2428258"/>
+            <a:ext cx="2094222" cy="268771"/>
+          </a:xfrm>
+          <a:prstGeom prst="rect">
+            <a:avLst/>
+          </a:prstGeom>
+          <a:noFill/>
+          <a:ln>
+            <a:noFill/>
+          </a:ln>
+          <a:effectLst/>
+        </p:spPr>
+        <p:style>
+          <a:lnRef idx="1">
+            <a:schemeClr val="accent1"/>
+          </a:lnRef>
+          <a:fillRef idx="3">
+            <a:schemeClr val="accent1"/>
+          </a:fillRef>
+          <a:effectRef idx="2">
+            <a:schemeClr val="accent1"/>
+          </a:effectRef>
+          <a:fontRef idx="minor">
+            <a:schemeClr val="lt1"/>
+          </a:fontRef>
+        </p:style>
+        <p:txBody>
+          <a:bodyPr rtlCol="0" anchor="ctr"/>
+          <a:lstStyle/>
+          <a:p>
+            <a:pPr algn="ctr"/>
+            <a:endParaRPr lang="en-US"/>
+          </a:p>
+        </p:txBody>
+      </p:sp>
+      <p:sp>
+        <p:nvSpPr>
+          <p:cNvPr id="90" name="Rectangle 89"/>
+          <p:cNvSpPr/>
+          <p:nvPr/>
+        </p:nvSpPr>
+        <p:spPr>
+          <a:xfrm>
+            <a:off x="3939157" y="4083165"/>
+            <a:ext cx="2654854" cy="247931"/>
+          </a:xfrm>
+          <a:prstGeom prst="rect">
+            <a:avLst/>
+          </a:prstGeom>
+          <a:noFill/>
+          <a:ln>
+            <a:noFill/>
+          </a:ln>
+          <a:effectLst/>
+        </p:spPr>
+        <p:style>
+          <a:lnRef idx="1">
+            <a:schemeClr val="accent1"/>
+          </a:lnRef>
+          <a:fillRef idx="3">
+            <a:schemeClr val="accent1"/>
+          </a:fillRef>
+          <a:effectRef idx="2">
+            <a:schemeClr val="accent1"/>
+          </a:effectRef>
+          <a:fontRef idx="minor">
+            <a:schemeClr val="lt1"/>
+          </a:fontRef>
+        </p:style>
+        <p:txBody>
+          <a:bodyPr rtlCol="0" anchor="ctr"/>
+          <a:lstStyle/>
+          <a:p>
+            <a:pPr algn="ctr"/>
+            <a:endParaRPr lang="en-US"/>
+          </a:p>
+        </p:txBody>
+      </p:sp>
+      <p:sp>
+        <p:nvSpPr>
+          <p:cNvPr id="91" name="Rectangle 90"/>
+          <p:cNvSpPr/>
+          <p:nvPr/>
+        </p:nvSpPr>
+        <p:spPr>
+          <a:xfrm>
+            <a:off x="3842299" y="2783125"/>
+            <a:ext cx="2094222" cy="268771"/>
+          </a:xfrm>
+          <a:prstGeom prst="rect">
+            <a:avLst/>
+          </a:prstGeom>
+          <a:noFill/>
+          <a:ln>
+            <a:noFill/>
+          </a:ln>
+          <a:effectLst/>
+        </p:spPr>
+        <p:style>
+          <a:lnRef idx="1">
+            <a:schemeClr val="accent1"/>
+          </a:lnRef>
+          <a:fillRef idx="3">
+            <a:schemeClr val="accent1"/>
+          </a:fillRef>
+          <a:effectRef idx="2">
+            <a:schemeClr val="accent1"/>
+          </a:effectRef>
+          <a:fontRef idx="minor">
+            <a:schemeClr val="lt1"/>
+          </a:fontRef>
+        </p:style>
+        <p:txBody>
+          <a:bodyPr rtlCol="0" anchor="ctr"/>
+          <a:lstStyle/>
+          <a:p>
+            <a:pPr algn="ctr"/>
+            <a:endParaRPr lang="en-US"/>
+          </a:p>
+        </p:txBody>
+      </p:sp>
+      <p:sp>
+        <p:nvSpPr>
+          <p:cNvPr id="92" name="Rectangle 91"/>
+          <p:cNvSpPr/>
+          <p:nvPr/>
+        </p:nvSpPr>
+        <p:spPr>
+          <a:xfrm>
+            <a:off x="3842299" y="1263439"/>
+            <a:ext cx="1375559" cy="510667"/>
+          </a:xfrm>
+          <a:prstGeom prst="rect">
+            <a:avLst/>
+          </a:prstGeom>
+          <a:noFill/>
+          <a:ln>
+            <a:noFill/>
+          </a:ln>
+          <a:effectLst/>
+        </p:spPr>
+        <p:style>
+          <a:lnRef idx="1">
+            <a:schemeClr val="accent1"/>
+          </a:lnRef>
+          <a:fillRef idx="3">
+            <a:schemeClr val="accent1"/>
+          </a:fillRef>
+          <a:effectRef idx="2">
+            <a:schemeClr val="accent1"/>
+          </a:effectRef>
+          <a:fontRef idx="minor">
+            <a:schemeClr val="lt1"/>
+          </a:fontRef>
+        </p:style>
+        <p:txBody>
+          <a:bodyPr rtlCol="0" anchor="ctr"/>
+          <a:lstStyle/>
+          <a:p>
+            <a:pPr algn="ctr"/>
+            <a:endParaRPr lang="en-US"/>
+          </a:p>
+        </p:txBody>
+      </p:sp>
+      <p:sp>
+        <p:nvSpPr>
+          <p:cNvPr id="93" name="TextBox 92"/>
+          <p:cNvSpPr txBox="1"/>
+          <p:nvPr/>
+        </p:nvSpPr>
+        <p:spPr>
+          <a:xfrm>
+            <a:off x="3990946" y="1404774"/>
+            <a:ext cx="184666" cy="369332"/>
+          </a:xfrm>
+          <a:prstGeom prst="rect">
+            <a:avLst/>
+          </a:prstGeom>
+          <a:noFill/>
+        </p:spPr>
+        <p:txBody>
+          <a:bodyPr wrap="none" rtlCol="0">
+            <a:spAutoFit/>
+          </a:bodyPr>
+          <a:lstStyle/>
+          <a:p>
+            <a:endParaRPr lang="en-US" dirty="0"/>
+          </a:p>
+        </p:txBody>
+      </p:sp>
+      <p:sp>
+        <p:nvSpPr>
+          <p:cNvPr id="94" name="Rounded Rectangle 93"/>
+          <p:cNvSpPr/>
+          <p:nvPr/>
+        </p:nvSpPr>
+        <p:spPr>
+          <a:xfrm>
+            <a:off x="331718" y="1108108"/>
+            <a:ext cx="3239495" cy="519044"/>
+          </a:xfrm>
+          <a:prstGeom prst="roundRect">
+            <a:avLst/>
+          </a:prstGeom>
+          <a:noFill/>
+          <a:ln w="28575" cmpd="sng">
+            <a:solidFill>
+              <a:srgbClr val="000000"/>
+            </a:solidFill>
+          </a:ln>
+          <a:effectLst/>
+        </p:spPr>
+        <p:style>
+          <a:lnRef idx="1">
+            <a:schemeClr val="accent1"/>
+          </a:lnRef>
+          <a:fillRef idx="3">
+            <a:schemeClr val="accent1"/>
+          </a:fillRef>
+          <a:effectRef idx="2">
+            <a:schemeClr val="accent1"/>
+          </a:effectRef>
+          <a:fontRef idx="minor">
+            <a:schemeClr val="lt1"/>
+          </a:fontRef>
+        </p:style>
+        <p:txBody>
+          <a:bodyPr rtlCol="0" anchor="ctr"/>
+          <a:lstStyle/>
+          <a:p>
+            <a:pPr lvl="0"/>
+            <a:r>
+              <a:rPr lang="en-US" sz="1200" dirty="0" smtClean="0">
+                <a:solidFill>
+                  <a:schemeClr val="tx1"/>
+                </a:solidFill>
+                <a:latin typeface="+mj-lt"/>
+                <a:cs typeface="Courier"/>
+              </a:rPr>
+              <a:t>f = </a:t>
+            </a:r>
+            <a:r>
+              <a:rPr lang="en-US" sz="1200" dirty="0" err="1" smtClean="0">
+                <a:solidFill>
+                  <a:schemeClr val="tx1"/>
+                </a:solidFill>
+                <a:latin typeface="+mj-lt"/>
+                <a:cs typeface="Courier"/>
+              </a:rPr>
+              <a:t>omsi_file</a:t>
+            </a:r>
+            <a:r>
+              <a:rPr lang="en-US" sz="1200" dirty="0" smtClean="0">
+                <a:solidFill>
+                  <a:schemeClr val="tx1"/>
+                </a:solidFill>
+                <a:latin typeface="+mj-lt"/>
+                <a:cs typeface="Courier"/>
+              </a:rPr>
+              <a:t>(‘/20120711_Brain.h5' , 'r')</a:t>
+            </a:r>
+            <a:br>
+              <a:rPr lang="en-US" sz="1200" dirty="0" smtClean="0">
+                <a:solidFill>
+                  <a:schemeClr val="tx1"/>
+                </a:solidFill>
+                <a:latin typeface="+mj-lt"/>
+                <a:cs typeface="Courier"/>
+              </a:rPr>
+            </a:br>
+            <a:r>
+              <a:rPr lang="en-US" sz="1200" dirty="0" smtClean="0">
+                <a:solidFill>
+                  <a:schemeClr val="tx1"/>
+                </a:solidFill>
+                <a:latin typeface="+mj-lt"/>
+                <a:cs typeface="Courier"/>
+              </a:rPr>
+              <a:t>d =</a:t>
+            </a:r>
+            <a:r>
+              <a:rPr lang="en-US" sz="1200" dirty="0" err="1" smtClean="0">
+                <a:solidFill>
+                  <a:schemeClr val="tx1"/>
+                </a:solidFill>
+                <a:latin typeface="+mj-lt"/>
+                <a:cs typeface="Courier"/>
+              </a:rPr>
+              <a:t>f.get_experiment</a:t>
+            </a:r>
+            <a:r>
+              <a:rPr lang="en-US" sz="1200" dirty="0" smtClean="0">
+                <a:solidFill>
+                  <a:schemeClr val="tx1"/>
+                </a:solidFill>
+                <a:latin typeface="+mj-lt"/>
+                <a:cs typeface="Courier"/>
+              </a:rPr>
+              <a:t>(0).</a:t>
+            </a:r>
+            <a:r>
+              <a:rPr lang="en-US" sz="1200" dirty="0" err="1" smtClean="0">
+                <a:solidFill>
+                  <a:schemeClr val="tx1"/>
+                </a:solidFill>
+                <a:latin typeface="+mj-lt"/>
+                <a:cs typeface="Courier"/>
+              </a:rPr>
+              <a:t>get_msidata</a:t>
+            </a:r>
+            <a:r>
+              <a:rPr lang="en-US" sz="1200" dirty="0" smtClean="0">
+                <a:solidFill>
+                  <a:schemeClr val="tx1"/>
+                </a:solidFill>
+                <a:latin typeface="+mj-lt"/>
+                <a:cs typeface="Courier"/>
+              </a:rPr>
+              <a:t>(0)</a:t>
+            </a:r>
+          </a:p>
+        </p:txBody>
+      </p:sp>
+      <p:sp>
+        <p:nvSpPr>
+          <p:cNvPr id="95" name="Rounded Rectangle 94"/>
+          <p:cNvSpPr/>
+          <p:nvPr/>
+        </p:nvSpPr>
+        <p:spPr>
+          <a:xfrm>
+            <a:off x="331718" y="2051052"/>
+            <a:ext cx="3239495" cy="648035"/>
+          </a:xfrm>
+          <a:prstGeom prst="roundRect">
+            <a:avLst/>
+          </a:prstGeom>
+          <a:noFill/>
+          <a:ln w="28575" cmpd="sng">
+            <a:solidFill>
+              <a:srgbClr val="000000"/>
+            </a:solidFill>
+          </a:ln>
+          <a:effectLst/>
+        </p:spPr>
+        <p:style>
+          <a:lnRef idx="1">
+            <a:schemeClr val="accent1"/>
+          </a:lnRef>
+          <a:fillRef idx="3">
+            <a:schemeClr val="accent1"/>
+          </a:fillRef>
+          <a:effectRef idx="2">
+            <a:schemeClr val="accent1"/>
+          </a:effectRef>
+          <a:fontRef idx="minor">
+            <a:schemeClr val="lt1"/>
+          </a:fontRef>
+        </p:style>
+        <p:txBody>
+          <a:bodyPr rtlCol="0" anchor="ctr"/>
+          <a:lstStyle/>
+          <a:p>
+            <a:r>
+              <a:rPr lang="en-US" sz="1200" dirty="0" smtClean="0">
+                <a:solidFill>
+                  <a:schemeClr val="tx1"/>
+                </a:solidFill>
+                <a:latin typeface="+mj-lt"/>
+                <a:cs typeface="Courier"/>
+              </a:rPr>
+              <a:t>a1 = </a:t>
+            </a:r>
+            <a:r>
+              <a:rPr lang="en-US" sz="1200" dirty="0" err="1" smtClean="0">
+                <a:solidFill>
+                  <a:schemeClr val="tx1"/>
+                </a:solidFill>
+                <a:latin typeface="+mj-lt"/>
+                <a:cs typeface="Courier"/>
+              </a:rPr>
+              <a:t>omsi_findpeaks_global</a:t>
+            </a:r>
+            <a:r>
+              <a:rPr lang="en-US" sz="1200" dirty="0" smtClean="0">
+                <a:solidFill>
+                  <a:schemeClr val="tx1"/>
+                </a:solidFill>
+                <a:latin typeface="+mj-lt"/>
+                <a:cs typeface="Courier"/>
+              </a:rPr>
+              <a:t>()</a:t>
+            </a:r>
+          </a:p>
+        </p:txBody>
+      </p:sp>
+      <p:sp>
+        <p:nvSpPr>
+          <p:cNvPr id="96" name="TextBox 95"/>
+          <p:cNvSpPr txBox="1"/>
+          <p:nvPr/>
+        </p:nvSpPr>
+        <p:spPr>
+          <a:xfrm>
+            <a:off x="301551" y="1747931"/>
+            <a:ext cx="1584050" cy="307777"/>
+          </a:xfrm>
+          <a:prstGeom prst="rect">
+            <a:avLst/>
+          </a:prstGeom>
+          <a:noFill/>
+        </p:spPr>
+        <p:txBody>
+          <a:bodyPr wrap="none" rtlCol="0">
+            <a:spAutoFit/>
+          </a:bodyPr>
+          <a:lstStyle/>
+          <a:p>
+            <a:r>
+              <a:rPr lang="en-US" sz="1400" b="1" dirty="0" smtClean="0"/>
+              <a:t>Global Peak Finder</a:t>
+            </a:r>
+            <a:endParaRPr lang="en-US" sz="1400" b="1" dirty="0"/>
+          </a:p>
+        </p:txBody>
+      </p:sp>
+      <p:sp>
+        <p:nvSpPr>
+          <p:cNvPr id="97" name="TextBox 96"/>
+          <p:cNvSpPr txBox="1"/>
+          <p:nvPr/>
+        </p:nvSpPr>
+        <p:spPr>
+          <a:xfrm>
+            <a:off x="301550" y="809604"/>
+            <a:ext cx="1413656" cy="307777"/>
+          </a:xfrm>
+          <a:prstGeom prst="rect">
+            <a:avLst/>
+          </a:prstGeom>
+          <a:noFill/>
+        </p:spPr>
+        <p:txBody>
+          <a:bodyPr wrap="none" rtlCol="0">
+            <a:spAutoFit/>
+          </a:bodyPr>
+          <a:lstStyle/>
+          <a:p>
+            <a:r>
+              <a:rPr lang="en-US" sz="1400" b="1" dirty="0" smtClean="0"/>
+              <a:t>Access MSI Data</a:t>
+            </a:r>
+            <a:endParaRPr lang="en-US" sz="1400" b="1" dirty="0"/>
+          </a:p>
+        </p:txBody>
+      </p:sp>
+      <p:sp>
+        <p:nvSpPr>
+          <p:cNvPr id="98" name="Rectangle 97"/>
+          <p:cNvSpPr/>
+          <p:nvPr/>
+        </p:nvSpPr>
+        <p:spPr>
+          <a:xfrm>
+            <a:off x="4544421" y="1355026"/>
+            <a:ext cx="1436129" cy="461665"/>
+          </a:xfrm>
+          <a:prstGeom prst="rect">
+            <a:avLst/>
+          </a:prstGeom>
+          <a:noFill/>
+        </p:spPr>
+        <p:txBody>
+          <a:bodyPr wrap="square">
+            <a:spAutoFit/>
+          </a:bodyPr>
+          <a:lstStyle/>
+          <a:p>
+            <a:r>
+              <a:rPr lang="en-US" sz="1200" dirty="0" smtClean="0">
+                <a:solidFill>
+                  <a:schemeClr val="tx1"/>
+                </a:solidFill>
+              </a:rPr>
+              <a:t>a1['</a:t>
+            </a:r>
+            <a:r>
+              <a:rPr lang="en-US" sz="1200" dirty="0" err="1" smtClean="0">
+                <a:solidFill>
+                  <a:schemeClr val="tx1"/>
+                </a:solidFill>
+              </a:rPr>
+              <a:t>msidata</a:t>
+            </a:r>
+            <a:r>
+              <a:rPr lang="en-US" sz="1200" dirty="0" smtClean="0">
+                <a:solidFill>
+                  <a:schemeClr val="tx1"/>
+                </a:solidFill>
+              </a:rPr>
+              <a:t>'] = d</a:t>
+            </a:r>
+            <a:br>
+              <a:rPr lang="en-US" sz="1200" dirty="0" smtClean="0">
+                <a:solidFill>
+                  <a:schemeClr val="tx1"/>
+                </a:solidFill>
+              </a:rPr>
+            </a:br>
+            <a:r>
+              <a:rPr lang="en-US" sz="1200" dirty="0" smtClean="0">
+                <a:solidFill>
+                  <a:schemeClr val="tx1"/>
+                </a:solidFill>
+              </a:rPr>
+              <a:t>a1['</a:t>
+            </a:r>
+            <a:r>
+              <a:rPr lang="en-US" sz="1200" dirty="0" err="1" smtClean="0">
+                <a:solidFill>
+                  <a:schemeClr val="tx1"/>
+                </a:solidFill>
+              </a:rPr>
+              <a:t>mzdata</a:t>
+            </a:r>
+            <a:r>
+              <a:rPr lang="en-US" sz="1200" dirty="0" smtClean="0">
+                <a:solidFill>
+                  <a:schemeClr val="tx1"/>
+                </a:solidFill>
+              </a:rPr>
+              <a:t>'] = </a:t>
+            </a:r>
+            <a:r>
+              <a:rPr lang="en-US" sz="1200" dirty="0" err="1" smtClean="0">
+                <a:solidFill>
+                  <a:schemeClr val="tx1"/>
+                </a:solidFill>
+              </a:rPr>
+              <a:t>d.mz</a:t>
+            </a:r>
+            <a:endParaRPr lang="en-US" sz="1200" dirty="0" smtClean="0">
+              <a:solidFill>
+                <a:schemeClr val="tx1"/>
+              </a:solidFill>
+            </a:endParaRPr>
+          </a:p>
+        </p:txBody>
+      </p:sp>
+      <p:sp>
+        <p:nvSpPr>
+          <p:cNvPr id="99" name="Rounded Rectangle 98"/>
+          <p:cNvSpPr/>
+          <p:nvPr/>
+        </p:nvSpPr>
+        <p:spPr>
+          <a:xfrm>
+            <a:off x="331718" y="3083702"/>
+            <a:ext cx="3239495" cy="1423526"/>
+          </a:xfrm>
+          <a:prstGeom prst="roundRect">
+            <a:avLst/>
+          </a:prstGeom>
+          <a:noFill/>
+          <a:ln w="28575" cmpd="sng">
+            <a:solidFill>
+              <a:srgbClr val="000000"/>
+            </a:solidFill>
+          </a:ln>
+          <a:effectLst/>
+        </p:spPr>
+        <p:style>
+          <a:lnRef idx="1">
+            <a:schemeClr val="accent1"/>
+          </a:lnRef>
+          <a:fillRef idx="3">
+            <a:schemeClr val="accent1"/>
+          </a:fillRef>
+          <a:effectRef idx="2">
+            <a:schemeClr val="accent1"/>
+          </a:effectRef>
+          <a:fontRef idx="minor">
+            <a:schemeClr val="lt1"/>
+          </a:fontRef>
+        </p:style>
+        <p:txBody>
+          <a:bodyPr rtlCol="0" anchor="ctr"/>
+          <a:lstStyle/>
+          <a:p>
+            <a:r>
+              <a:rPr lang="en-US" sz="1200" dirty="0" err="1">
+                <a:solidFill>
+                  <a:srgbClr val="10253F"/>
+                </a:solidFill>
+              </a:rPr>
+              <a:t>d</a:t>
+            </a:r>
+            <a:r>
+              <a:rPr lang="en-US" sz="1200" dirty="0" err="1" smtClean="0">
+                <a:solidFill>
+                  <a:srgbClr val="10253F"/>
+                </a:solidFill>
+              </a:rPr>
+              <a:t>ef</a:t>
+            </a:r>
+            <a:r>
+              <a:rPr lang="en-US" sz="1200" dirty="0" smtClean="0">
+                <a:solidFill>
+                  <a:srgbClr val="10253F"/>
+                </a:solidFill>
+              </a:rPr>
+              <a:t> normalize(</a:t>
+            </a:r>
+            <a:r>
+              <a:rPr lang="en-US" sz="1200" dirty="0" err="1" smtClean="0">
+                <a:solidFill>
+                  <a:srgbClr val="10253F"/>
+                </a:solidFill>
+              </a:rPr>
+              <a:t>msidata</a:t>
+            </a:r>
+            <a:r>
+              <a:rPr lang="en-US" sz="1200" dirty="0" smtClean="0">
+                <a:solidFill>
+                  <a:srgbClr val="10253F"/>
+                </a:solidFill>
+              </a:rPr>
+              <a:t>)</a:t>
+            </a:r>
+            <a:r>
+              <a:rPr lang="en-US" sz="1200" dirty="0" smtClean="0">
+                <a:solidFill>
+                  <a:srgbClr val="10253F"/>
+                </a:solidFill>
+              </a:rPr>
+              <a:t>:</a:t>
+            </a:r>
+            <a:br>
+              <a:rPr lang="en-US" sz="1200" dirty="0" smtClean="0">
+                <a:solidFill>
+                  <a:srgbClr val="10253F"/>
+                </a:solidFill>
+              </a:rPr>
+            </a:br>
+            <a:r>
+              <a:rPr lang="en-US" sz="1200" dirty="0" smtClean="0">
+                <a:solidFill>
+                  <a:srgbClr val="10253F"/>
+                </a:solidFill>
+              </a:rPr>
+              <a:t>    </a:t>
+            </a:r>
+            <a:r>
+              <a:rPr lang="en-US" sz="1200" dirty="0" smtClean="0">
+                <a:solidFill>
+                  <a:srgbClr val="10253F"/>
+                </a:solidFill>
+              </a:rPr>
+              <a:t> norm = </a:t>
+            </a:r>
+            <a:r>
+              <a:rPr lang="en-US" sz="1200" dirty="0" err="1" smtClean="0">
+                <a:solidFill>
+                  <a:srgbClr val="10253F"/>
+                </a:solidFill>
+              </a:rPr>
+              <a:t>np.sum</a:t>
+            </a:r>
+            <a:r>
+              <a:rPr lang="en-US" sz="1200" dirty="0" smtClean="0">
+                <a:solidFill>
+                  <a:srgbClr val="10253F"/>
+                </a:solidFill>
+              </a:rPr>
+              <a:t>(</a:t>
+            </a:r>
+            <a:r>
+              <a:rPr lang="en-US" sz="1200" dirty="0" err="1" smtClean="0">
+                <a:solidFill>
+                  <a:srgbClr val="10253F"/>
+                </a:solidFill>
+              </a:rPr>
+              <a:t>msidata</a:t>
+            </a:r>
+            <a:r>
+              <a:rPr lang="en-US" sz="1200" dirty="0" smtClean="0">
+                <a:solidFill>
+                  <a:srgbClr val="10253F"/>
+                </a:solidFill>
+              </a:rPr>
+              <a:t>, axis</a:t>
+            </a:r>
+            <a:r>
+              <a:rPr lang="en-US" sz="1200" dirty="0" smtClean="0">
+                <a:solidFill>
+                  <a:srgbClr val="10253F"/>
+                </a:solidFill>
+              </a:rPr>
+              <a:t>=2)</a:t>
+            </a:r>
+          </a:p>
+          <a:p>
+            <a:r>
+              <a:rPr lang="en-US" sz="1200" dirty="0">
+                <a:solidFill>
+                  <a:srgbClr val="10253F"/>
+                </a:solidFill>
+              </a:rPr>
+              <a:t> </a:t>
+            </a:r>
+            <a:r>
+              <a:rPr lang="en-US" sz="1200" dirty="0" smtClean="0">
+                <a:solidFill>
+                  <a:srgbClr val="10253F"/>
+                </a:solidFill>
+              </a:rPr>
+              <a:t>    return </a:t>
+            </a:r>
+            <a:r>
+              <a:rPr lang="en-US" sz="1200" dirty="0" err="1">
+                <a:solidFill>
+                  <a:srgbClr val="10253F"/>
+                </a:solidFill>
+              </a:rPr>
+              <a:t>msidata</a:t>
+            </a:r>
+            <a:r>
+              <a:rPr lang="en-US" sz="1200" dirty="0">
+                <a:solidFill>
+                  <a:srgbClr val="10253F"/>
+                </a:solidFill>
+              </a:rPr>
+              <a:t> / </a:t>
+            </a:r>
+            <a:r>
+              <a:rPr lang="en-US" sz="1200" dirty="0" smtClean="0">
+                <a:solidFill>
+                  <a:srgbClr val="10253F"/>
+                </a:solidFill>
+              </a:rPr>
+              <a:t>norm[</a:t>
+            </a:r>
+            <a:r>
+              <a:rPr lang="en-US" sz="1200" dirty="0">
+                <a:solidFill>
+                  <a:srgbClr val="10253F"/>
+                </a:solidFill>
+              </a:rPr>
+              <a:t>:,:,</a:t>
+            </a:r>
+            <a:r>
+              <a:rPr lang="en-US" sz="1200" dirty="0" err="1">
+                <a:solidFill>
+                  <a:srgbClr val="10253F"/>
+                </a:solidFill>
+              </a:rPr>
+              <a:t>np.newaxis</a:t>
+            </a:r>
+            <a:r>
+              <a:rPr lang="en-US" sz="1200" dirty="0">
+                <a:solidFill>
+                  <a:srgbClr val="10253F"/>
+                </a:solidFill>
+              </a:rPr>
+              <a:t>]</a:t>
+            </a:r>
+            <a:endParaRPr lang="en-US" sz="1200" dirty="0" smtClean="0">
+              <a:solidFill>
+                <a:srgbClr val="10253F"/>
+              </a:solidFill>
+            </a:endParaRPr>
+          </a:p>
+          <a:p>
+            <a:endParaRPr lang="en-US" sz="1200" dirty="0" smtClean="0">
+              <a:solidFill>
+                <a:srgbClr val="10253F"/>
+              </a:solidFill>
+              <a:latin typeface="+mj-lt"/>
+              <a:cs typeface="Courier"/>
+            </a:endParaRPr>
+          </a:p>
+          <a:p>
+            <a:r>
+              <a:rPr lang="en-US" sz="1200" dirty="0" smtClean="0">
+                <a:solidFill>
+                  <a:srgbClr val="10253F"/>
+                </a:solidFill>
+                <a:latin typeface="+mj-lt"/>
+                <a:cs typeface="Courier"/>
+              </a:rPr>
+              <a:t>a2=</a:t>
+            </a:r>
+            <a:r>
+              <a:rPr lang="en-US" sz="1200" dirty="0" err="1" smtClean="0">
+                <a:solidFill>
+                  <a:srgbClr val="10253F"/>
+                </a:solidFill>
+                <a:latin typeface="+mj-lt"/>
+                <a:cs typeface="Courier"/>
+              </a:rPr>
+              <a:t>analysis_generic.from_function</a:t>
+            </a:r>
+            <a:r>
+              <a:rPr lang="en-US" sz="1200" dirty="0" smtClean="0">
+                <a:solidFill>
+                  <a:srgbClr val="10253F"/>
+                </a:solidFill>
+                <a:latin typeface="+mj-lt"/>
+                <a:cs typeface="Courier"/>
+              </a:rPr>
+              <a:t>(normalize)</a:t>
+            </a:r>
+            <a:endParaRPr lang="en-US" sz="1200" dirty="0" smtClean="0">
+              <a:solidFill>
+                <a:srgbClr val="10253F"/>
+              </a:solidFill>
+              <a:latin typeface="+mj-lt"/>
+              <a:cs typeface="Courier"/>
+            </a:endParaRPr>
+          </a:p>
+        </p:txBody>
+      </p:sp>
+      <p:sp>
+        <p:nvSpPr>
+          <p:cNvPr id="100" name="TextBox 99"/>
+          <p:cNvSpPr txBox="1"/>
+          <p:nvPr/>
+        </p:nvSpPr>
+        <p:spPr>
+          <a:xfrm>
+            <a:off x="301551" y="2789769"/>
+            <a:ext cx="1826179" cy="307777"/>
+          </a:xfrm>
+          <a:prstGeom prst="rect">
+            <a:avLst/>
+          </a:prstGeom>
+          <a:noFill/>
+        </p:spPr>
+        <p:txBody>
+          <a:bodyPr wrap="none" rtlCol="0">
+            <a:spAutoFit/>
+          </a:bodyPr>
+          <a:lstStyle/>
+          <a:p>
+            <a:r>
+              <a:rPr lang="en-US" sz="1400" b="1" dirty="0" smtClean="0"/>
+              <a:t>Normalize the spectra</a:t>
+            </a:r>
+            <a:endParaRPr lang="en-US" sz="1400" b="1" dirty="0"/>
+          </a:p>
+        </p:txBody>
+      </p:sp>
+      <p:sp>
+        <p:nvSpPr>
+          <p:cNvPr id="105" name="Rounded Rectangle 104"/>
+          <p:cNvSpPr/>
+          <p:nvPr/>
+        </p:nvSpPr>
+        <p:spPr>
+          <a:xfrm>
+            <a:off x="331718" y="4870086"/>
+            <a:ext cx="3239496" cy="370863"/>
+          </a:xfrm>
+          <a:prstGeom prst="roundRect">
+            <a:avLst/>
+          </a:prstGeom>
+          <a:noFill/>
+          <a:ln w="28575" cmpd="sng">
+            <a:solidFill>
+              <a:srgbClr val="000000"/>
+            </a:solidFill>
+          </a:ln>
+          <a:effectLst/>
+        </p:spPr>
+        <p:style>
+          <a:lnRef idx="1">
+            <a:schemeClr val="accent1"/>
+          </a:lnRef>
+          <a:fillRef idx="3">
+            <a:schemeClr val="accent1"/>
+          </a:fillRef>
+          <a:effectRef idx="2">
+            <a:schemeClr val="accent1"/>
+          </a:effectRef>
+          <a:fontRef idx="minor">
+            <a:schemeClr val="lt1"/>
+          </a:fontRef>
+        </p:style>
+        <p:txBody>
+          <a:bodyPr rtlCol="0" anchor="ctr"/>
+          <a:lstStyle/>
+          <a:p>
+            <a:r>
+              <a:rPr lang="en-US" sz="1200" dirty="0" smtClean="0">
+                <a:solidFill>
+                  <a:srgbClr val="10253F"/>
+                </a:solidFill>
+                <a:cs typeface="Courier"/>
+              </a:rPr>
+              <a:t>a3 </a:t>
+            </a:r>
+            <a:r>
+              <a:rPr lang="en-US" sz="1200" dirty="0" smtClean="0">
+                <a:solidFill>
+                  <a:srgbClr val="10253F"/>
+                </a:solidFill>
+                <a:cs typeface="Courier"/>
+              </a:rPr>
+              <a:t>= </a:t>
+            </a:r>
+            <a:r>
+              <a:rPr lang="en-US" sz="1200" dirty="0" err="1" smtClean="0">
+                <a:solidFill>
+                  <a:srgbClr val="10253F"/>
+                </a:solidFill>
+                <a:cs typeface="Courier"/>
+              </a:rPr>
+              <a:t>cluster_kmeans</a:t>
+            </a:r>
+            <a:r>
+              <a:rPr lang="en-US" sz="1200" dirty="0" smtClean="0">
+                <a:solidFill>
+                  <a:srgbClr val="10253F"/>
+                </a:solidFill>
+                <a:cs typeface="Courier"/>
+              </a:rPr>
+              <a:t>()</a:t>
+            </a:r>
+            <a:endParaRPr lang="en-US" sz="1200" dirty="0" smtClean="0">
+              <a:solidFill>
+                <a:srgbClr val="10253F"/>
+              </a:solidFill>
+              <a:cs typeface="Courier"/>
+            </a:endParaRPr>
+          </a:p>
+        </p:txBody>
+      </p:sp>
+      <p:sp>
+        <p:nvSpPr>
+          <p:cNvPr id="106" name="TextBox 105"/>
+          <p:cNvSpPr txBox="1"/>
+          <p:nvPr/>
+        </p:nvSpPr>
+        <p:spPr>
+          <a:xfrm>
+            <a:off x="311028" y="4568918"/>
+            <a:ext cx="2390217" cy="307777"/>
+          </a:xfrm>
+          <a:prstGeom prst="rect">
+            <a:avLst/>
+          </a:prstGeom>
+          <a:noFill/>
+        </p:spPr>
+        <p:txBody>
+          <a:bodyPr wrap="square" rtlCol="0">
+            <a:spAutoFit/>
+          </a:bodyPr>
+          <a:lstStyle/>
+          <a:p>
+            <a:r>
+              <a:rPr lang="en-US" sz="1400" b="1" dirty="0" smtClean="0"/>
+              <a:t>Cluster spectra</a:t>
+            </a:r>
+            <a:endParaRPr lang="en-US" sz="1400" b="1" dirty="0"/>
+          </a:p>
+        </p:txBody>
+      </p:sp>
+      <p:sp>
+        <p:nvSpPr>
+          <p:cNvPr id="107" name="Rectangle 106"/>
+          <p:cNvSpPr/>
+          <p:nvPr/>
+        </p:nvSpPr>
+        <p:spPr>
+          <a:xfrm>
+            <a:off x="3842299" y="2490587"/>
+            <a:ext cx="2138251" cy="276999"/>
+          </a:xfrm>
+          <a:prstGeom prst="rect">
+            <a:avLst/>
+          </a:prstGeom>
+          <a:noFill/>
+        </p:spPr>
+        <p:txBody>
+          <a:bodyPr wrap="none">
+            <a:spAutoFit/>
+          </a:bodyPr>
+          <a:lstStyle/>
+          <a:p>
+            <a:r>
+              <a:rPr lang="en-US" sz="1200" dirty="0" smtClean="0"/>
+              <a:t>a2['</a:t>
+            </a:r>
+            <a:r>
+              <a:rPr lang="en-US" sz="1200" dirty="0" err="1" smtClean="0"/>
+              <a:t>msidata</a:t>
+            </a:r>
+            <a:r>
+              <a:rPr lang="en-US" sz="1200" dirty="0" smtClean="0"/>
+              <a:t>'] = a1['</a:t>
+            </a:r>
+            <a:r>
+              <a:rPr lang="en-US" sz="1200" dirty="0" err="1" smtClean="0"/>
+              <a:t>peak_cube</a:t>
+            </a:r>
+            <a:r>
+              <a:rPr lang="en-US" sz="1200" dirty="0" smtClean="0"/>
+              <a:t>']</a:t>
+            </a:r>
+            <a:endParaRPr lang="en-US" sz="1200" dirty="0"/>
+          </a:p>
+        </p:txBody>
+      </p:sp>
+      <p:sp>
+        <p:nvSpPr>
+          <p:cNvPr id="108" name="Rectangle 107"/>
+          <p:cNvSpPr/>
+          <p:nvPr/>
+        </p:nvSpPr>
+        <p:spPr>
+          <a:xfrm>
+            <a:off x="3971990" y="3796839"/>
+            <a:ext cx="2047481" cy="276999"/>
+          </a:xfrm>
+          <a:prstGeom prst="rect">
+            <a:avLst/>
+          </a:prstGeom>
+          <a:noFill/>
+        </p:spPr>
+        <p:txBody>
+          <a:bodyPr wrap="none">
+            <a:spAutoFit/>
+          </a:bodyPr>
+          <a:lstStyle/>
+          <a:p>
+            <a:r>
+              <a:rPr lang="en-US" sz="1200" dirty="0"/>
+              <a:t>a3</a:t>
+            </a:r>
+            <a:r>
+              <a:rPr lang="en-US" sz="1200" dirty="0" smtClean="0"/>
+              <a:t>[’</a:t>
+            </a:r>
+            <a:r>
+              <a:rPr lang="en-US" sz="1200" dirty="0" err="1" smtClean="0"/>
+              <a:t>msidata</a:t>
+            </a:r>
+            <a:r>
+              <a:rPr lang="en-US" sz="1200" dirty="0" smtClean="0"/>
+              <a:t>'</a:t>
+            </a:r>
+            <a:r>
+              <a:rPr lang="en-US" sz="1200" dirty="0"/>
+              <a:t>] = a2</a:t>
+            </a:r>
+            <a:r>
+              <a:rPr lang="en-US" sz="1200" dirty="0" smtClean="0"/>
+              <a:t>[‘output_0'</a:t>
+            </a:r>
+            <a:r>
+              <a:rPr lang="en-US" sz="1200" dirty="0"/>
+              <a:t>]</a:t>
+            </a:r>
+          </a:p>
+        </p:txBody>
+      </p:sp>
+      <p:cxnSp>
+        <p:nvCxnSpPr>
+          <p:cNvPr id="117" name="Elbow Connector 116"/>
+          <p:cNvCxnSpPr>
+            <a:endCxn id="94" idx="3"/>
+          </p:cNvCxnSpPr>
+          <p:nvPr/>
+        </p:nvCxnSpPr>
+        <p:spPr>
+          <a:xfrm rot="5400000" flipH="1" flipV="1">
+            <a:off x="3092642" y="1846201"/>
+            <a:ext cx="957142" cy="12700"/>
+          </a:xfrm>
+          <a:prstGeom prst="bentConnector4">
+            <a:avLst>
+              <a:gd name="adj1" fmla="val 797"/>
+              <a:gd name="adj2" fmla="val 18673504"/>
+            </a:avLst>
+          </a:prstGeom>
+          <a:ln>
+            <a:solidFill>
+              <a:srgbClr val="FF0000"/>
+            </a:solidFill>
+            <a:tailEnd type="arrow"/>
+          </a:ln>
+          <a:effectLst/>
+        </p:spPr>
+        <p:style>
+          <a:lnRef idx="2">
+            <a:schemeClr val="accent1"/>
+          </a:lnRef>
+          <a:fillRef idx="0">
+            <a:schemeClr val="accent1"/>
+          </a:fillRef>
+          <a:effectRef idx="1">
+            <a:schemeClr val="accent1"/>
+          </a:effectRef>
+          <a:fontRef idx="minor">
+            <a:schemeClr val="tx1"/>
+          </a:fontRef>
+        </p:style>
+      </p:cxnSp>
+      <p:cxnSp>
+        <p:nvCxnSpPr>
+          <p:cNvPr id="118" name="Elbow Connector 117"/>
+          <p:cNvCxnSpPr>
+            <a:stCxn id="121" idx="3"/>
+            <a:endCxn id="120" idx="3"/>
+          </p:cNvCxnSpPr>
+          <p:nvPr/>
+        </p:nvCxnSpPr>
+        <p:spPr>
+          <a:xfrm flipH="1" flipV="1">
+            <a:off x="3575625" y="2497530"/>
+            <a:ext cx="6351" cy="1123437"/>
+          </a:xfrm>
+          <a:prstGeom prst="bentConnector3">
+            <a:avLst>
+              <a:gd name="adj1" fmla="val -37152480"/>
+            </a:avLst>
+          </a:prstGeom>
+          <a:ln>
+            <a:solidFill>
+              <a:srgbClr val="FF0000"/>
+            </a:solidFill>
+            <a:tailEnd type="arrow"/>
+          </a:ln>
+          <a:effectLst/>
+        </p:spPr>
+        <p:style>
+          <a:lnRef idx="2">
+            <a:schemeClr val="accent1"/>
+          </a:lnRef>
+          <a:fillRef idx="0">
+            <a:schemeClr val="accent1"/>
+          </a:fillRef>
+          <a:effectRef idx="1">
+            <a:schemeClr val="accent1"/>
+          </a:effectRef>
+          <a:fontRef idx="minor">
+            <a:schemeClr val="tx1"/>
+          </a:fontRef>
+        </p:style>
+      </p:cxnSp>
+      <p:sp>
+        <p:nvSpPr>
+          <p:cNvPr id="120" name="Rectangle 119"/>
+          <p:cNvSpPr/>
+          <p:nvPr/>
+        </p:nvSpPr>
+        <p:spPr>
+          <a:xfrm>
+            <a:off x="3446476" y="2407654"/>
+            <a:ext cx="129149" cy="179751"/>
+          </a:xfrm>
+          <a:prstGeom prst="rect">
+            <a:avLst/>
+          </a:prstGeom>
+          <a:noFill/>
+          <a:ln>
+            <a:noFill/>
+          </a:ln>
+        </p:spPr>
+        <p:style>
+          <a:lnRef idx="1">
+            <a:schemeClr val="accent1"/>
+          </a:lnRef>
+          <a:fillRef idx="3">
+            <a:schemeClr val="accent1"/>
+          </a:fillRef>
+          <a:effectRef idx="2">
+            <a:schemeClr val="accent1"/>
+          </a:effectRef>
+          <a:fontRef idx="minor">
+            <a:schemeClr val="lt1"/>
+          </a:fontRef>
+        </p:style>
+        <p:txBody>
+          <a:bodyPr rtlCol="0" anchor="ctr"/>
+          <a:lstStyle/>
+          <a:p>
+            <a:pPr algn="ctr"/>
+            <a:endParaRPr lang="en-US"/>
+          </a:p>
+        </p:txBody>
+      </p:sp>
+      <p:sp>
+        <p:nvSpPr>
+          <p:cNvPr id="121" name="Rectangle 120"/>
+          <p:cNvSpPr/>
+          <p:nvPr/>
+        </p:nvSpPr>
+        <p:spPr>
+          <a:xfrm>
+            <a:off x="3452827" y="3531091"/>
+            <a:ext cx="129149" cy="179751"/>
+          </a:xfrm>
+          <a:prstGeom prst="rect">
+            <a:avLst/>
+          </a:prstGeom>
+          <a:noFill/>
+          <a:ln>
+            <a:noFill/>
+          </a:ln>
+        </p:spPr>
+        <p:style>
+          <a:lnRef idx="1">
+            <a:schemeClr val="accent1"/>
+          </a:lnRef>
+          <a:fillRef idx="3">
+            <a:schemeClr val="accent1"/>
+          </a:fillRef>
+          <a:effectRef idx="2">
+            <a:schemeClr val="accent1"/>
+          </a:effectRef>
+          <a:fontRef idx="minor">
+            <a:schemeClr val="lt1"/>
+          </a:fontRef>
+        </p:style>
+        <p:txBody>
+          <a:bodyPr rtlCol="0" anchor="ctr"/>
+          <a:lstStyle/>
+          <a:p>
+            <a:pPr algn="ctr"/>
+            <a:endParaRPr lang="en-US"/>
+          </a:p>
+        </p:txBody>
+      </p:sp>
+      <p:sp>
+        <p:nvSpPr>
+          <p:cNvPr id="123" name="TextBox 122"/>
+          <p:cNvSpPr txBox="1"/>
+          <p:nvPr/>
+        </p:nvSpPr>
+        <p:spPr>
+          <a:xfrm>
+            <a:off x="236178" y="251540"/>
+            <a:ext cx="3335035" cy="369332"/>
+          </a:xfrm>
+          <a:prstGeom prst="rect">
+            <a:avLst/>
+          </a:prstGeom>
+          <a:noFill/>
+        </p:spPr>
+        <p:txBody>
+          <a:bodyPr wrap="square" rtlCol="0">
+            <a:spAutoFit/>
+          </a:bodyPr>
+          <a:lstStyle/>
+          <a:p>
+            <a:pPr algn="ctr"/>
+            <a:r>
+              <a:rPr lang="en-US" b="1" dirty="0" smtClean="0"/>
+              <a:t>Step1: Create </a:t>
+            </a:r>
+            <a:r>
+              <a:rPr lang="en-US" b="1" dirty="0" smtClean="0"/>
+              <a:t>Analysis Tasks</a:t>
+            </a:r>
+            <a:endParaRPr lang="en-US" b="1" dirty="0"/>
+          </a:p>
+        </p:txBody>
+      </p:sp>
+      <p:sp>
+        <p:nvSpPr>
+          <p:cNvPr id="124" name="TextBox 123"/>
+          <p:cNvSpPr txBox="1"/>
+          <p:nvPr/>
+        </p:nvSpPr>
+        <p:spPr>
+          <a:xfrm>
+            <a:off x="3564863" y="251560"/>
+            <a:ext cx="3360780" cy="369332"/>
+          </a:xfrm>
+          <a:prstGeom prst="rect">
+            <a:avLst/>
+          </a:prstGeom>
+          <a:noFill/>
+        </p:spPr>
+        <p:txBody>
+          <a:bodyPr wrap="square" rtlCol="0">
+            <a:spAutoFit/>
+          </a:bodyPr>
+          <a:lstStyle/>
+          <a:p>
+            <a:pPr algn="ctr"/>
+            <a:r>
+              <a:rPr lang="en-US" b="1" dirty="0" smtClean="0"/>
+              <a:t>Step2: Define </a:t>
+            </a:r>
+            <a:r>
+              <a:rPr lang="en-US" b="1" dirty="0" smtClean="0"/>
+              <a:t>Analysis Inputs</a:t>
+            </a:r>
+            <a:endParaRPr lang="en-US" b="1" dirty="0"/>
+          </a:p>
+        </p:txBody>
+      </p:sp>
+      <p:sp>
+        <p:nvSpPr>
+          <p:cNvPr id="125" name="TextBox 124"/>
+          <p:cNvSpPr txBox="1"/>
+          <p:nvPr/>
+        </p:nvSpPr>
+        <p:spPr>
+          <a:xfrm>
+            <a:off x="6925643" y="249846"/>
+            <a:ext cx="3439032" cy="369332"/>
+          </a:xfrm>
+          <a:prstGeom prst="rect">
+            <a:avLst/>
+          </a:prstGeom>
+          <a:noFill/>
+        </p:spPr>
+        <p:txBody>
+          <a:bodyPr wrap="square" rtlCol="0">
+            <a:spAutoFit/>
+          </a:bodyPr>
+          <a:lstStyle/>
+          <a:p>
+            <a:pPr algn="ctr"/>
+            <a:r>
+              <a:rPr lang="en-US" b="1" dirty="0" smtClean="0"/>
+              <a:t>Step 3: Execute</a:t>
+            </a:r>
+            <a:endParaRPr lang="en-US" b="1" dirty="0"/>
+          </a:p>
+        </p:txBody>
+      </p:sp>
+      <p:sp>
+        <p:nvSpPr>
+          <p:cNvPr id="126" name="Rectangle 125"/>
+          <p:cNvSpPr/>
+          <p:nvPr/>
+        </p:nvSpPr>
+        <p:spPr>
+          <a:xfrm>
+            <a:off x="7332746" y="2570705"/>
+            <a:ext cx="3015280" cy="461665"/>
+          </a:xfrm>
+          <a:prstGeom prst="rect">
+            <a:avLst/>
+          </a:prstGeom>
+          <a:noFill/>
+        </p:spPr>
+        <p:txBody>
+          <a:bodyPr wrap="square">
+            <a:spAutoFit/>
+          </a:bodyPr>
+          <a:lstStyle/>
+          <a:p>
+            <a:r>
+              <a:rPr lang="en-US" sz="1200" b="1" dirty="0" smtClean="0"/>
+              <a:t>#Option 2: </a:t>
+            </a:r>
+            <a:r>
+              <a:rPr lang="en-US" sz="1200" b="1" dirty="0" smtClean="0"/>
+              <a:t>Execute a single </a:t>
+            </a:r>
+            <a:r>
+              <a:rPr lang="en-US" sz="1200" b="1" dirty="0" smtClean="0"/>
+              <a:t>sub-workflow</a:t>
+            </a:r>
+          </a:p>
+          <a:p>
+            <a:r>
+              <a:rPr lang="en-US" sz="1200" dirty="0" smtClean="0"/>
+              <a:t>a4.execute_recursive</a:t>
+            </a:r>
+            <a:r>
+              <a:rPr lang="en-US" sz="1200" dirty="0"/>
+              <a:t>()</a:t>
+            </a:r>
+          </a:p>
+        </p:txBody>
+      </p:sp>
+      <p:sp>
+        <p:nvSpPr>
+          <p:cNvPr id="127" name="Rectangle 126"/>
+          <p:cNvSpPr/>
+          <p:nvPr/>
+        </p:nvSpPr>
+        <p:spPr>
+          <a:xfrm>
+            <a:off x="7332742" y="3397871"/>
+            <a:ext cx="3015281" cy="461665"/>
+          </a:xfrm>
+          <a:prstGeom prst="rect">
+            <a:avLst/>
+          </a:prstGeom>
+          <a:noFill/>
+        </p:spPr>
+        <p:txBody>
+          <a:bodyPr wrap="square">
+            <a:spAutoFit/>
+          </a:bodyPr>
+          <a:lstStyle/>
+          <a:p>
+            <a:r>
+              <a:rPr lang="en-US" sz="1200" b="1" dirty="0" smtClean="0"/>
+              <a:t>#Option 3: Execute all </a:t>
+            </a:r>
+            <a:endParaRPr lang="en-US" sz="1200" b="1" dirty="0" smtClean="0"/>
+          </a:p>
+          <a:p>
+            <a:r>
+              <a:rPr lang="en-US" sz="1200" dirty="0" smtClean="0"/>
+              <a:t>a3.execute_all()</a:t>
+            </a:r>
+            <a:endParaRPr lang="en-US" sz="1200" dirty="0"/>
+          </a:p>
+        </p:txBody>
+      </p:sp>
+      <p:sp>
+        <p:nvSpPr>
+          <p:cNvPr id="128" name="Rectangle 127"/>
+          <p:cNvSpPr/>
+          <p:nvPr/>
+        </p:nvSpPr>
+        <p:spPr>
+          <a:xfrm>
+            <a:off x="7332745" y="4135730"/>
+            <a:ext cx="3015280" cy="646331"/>
+          </a:xfrm>
+          <a:prstGeom prst="rect">
+            <a:avLst/>
+          </a:prstGeom>
+          <a:noFill/>
+        </p:spPr>
+        <p:txBody>
+          <a:bodyPr wrap="square">
+            <a:spAutoFit/>
+          </a:bodyPr>
+          <a:lstStyle/>
+          <a:p>
+            <a:r>
+              <a:rPr lang="en-US" sz="1200" b="1" dirty="0" smtClean="0"/>
+              <a:t>#Option 4: Execute multiple sub-workflows</a:t>
+            </a:r>
+          </a:p>
+          <a:p>
+            <a:r>
+              <a:rPr lang="en-US" sz="1200" dirty="0" err="1" smtClean="0"/>
+              <a:t>dr</a:t>
+            </a:r>
+            <a:r>
+              <a:rPr lang="en-US" sz="1200" dirty="0" smtClean="0"/>
+              <a:t> = </a:t>
+            </a:r>
+            <a:r>
+              <a:rPr lang="en-US" sz="1200" dirty="0" err="1" smtClean="0"/>
+              <a:t>greedy_workflow_driver</a:t>
+            </a:r>
+            <a:r>
+              <a:rPr lang="en-US" sz="1200" dirty="0" smtClean="0"/>
+              <a:t>([a1,a2,</a:t>
+            </a:r>
+            <a:r>
+              <a:rPr lang="en-US" sz="1200" dirty="0" smtClean="0"/>
+              <a:t>a3,a4]</a:t>
+            </a:r>
+            <a:r>
+              <a:rPr lang="en-US" sz="1200" dirty="0" smtClean="0"/>
+              <a:t>)</a:t>
+            </a:r>
+          </a:p>
+          <a:p>
+            <a:r>
+              <a:rPr lang="en-US" sz="1200" dirty="0" err="1" smtClean="0"/>
+              <a:t>dr.execute</a:t>
+            </a:r>
+            <a:r>
+              <a:rPr lang="en-US" sz="1200" dirty="0" smtClean="0"/>
+              <a:t>()</a:t>
+            </a:r>
+          </a:p>
+        </p:txBody>
+      </p:sp>
+      <p:sp>
+        <p:nvSpPr>
+          <p:cNvPr id="129" name="Rectangle 128"/>
+          <p:cNvSpPr/>
+          <p:nvPr/>
+        </p:nvSpPr>
+        <p:spPr>
+          <a:xfrm>
+            <a:off x="7332746" y="1787470"/>
+            <a:ext cx="3015280" cy="461665"/>
+          </a:xfrm>
+          <a:prstGeom prst="rect">
+            <a:avLst/>
+          </a:prstGeom>
+          <a:noFill/>
+        </p:spPr>
+        <p:txBody>
+          <a:bodyPr wrap="square">
+            <a:spAutoFit/>
+          </a:bodyPr>
+          <a:lstStyle/>
+          <a:p>
+            <a:r>
+              <a:rPr lang="en-US" sz="1200" b="1" dirty="0" smtClean="0"/>
+              <a:t>#Option 1: Execute a single analysis</a:t>
+            </a:r>
+          </a:p>
+          <a:p>
+            <a:r>
+              <a:rPr lang="en-US" sz="1200" dirty="0" smtClean="0"/>
+              <a:t>a1.execute()</a:t>
+            </a:r>
+          </a:p>
+        </p:txBody>
+      </p:sp>
+      <p:sp>
+        <p:nvSpPr>
+          <p:cNvPr id="130" name="Rounded Rectangle 129"/>
+          <p:cNvSpPr/>
+          <p:nvPr/>
+        </p:nvSpPr>
+        <p:spPr>
+          <a:xfrm>
+            <a:off x="7332747" y="1742832"/>
+            <a:ext cx="2903050" cy="519044"/>
+          </a:xfrm>
+          <a:prstGeom prst="roundRect">
+            <a:avLst/>
+          </a:prstGeom>
+          <a:noFill/>
+          <a:ln w="28575" cmpd="sng">
+            <a:solidFill>
+              <a:srgbClr val="000000"/>
+            </a:solidFill>
+          </a:ln>
+          <a:effectLst/>
+        </p:spPr>
+        <p:style>
+          <a:lnRef idx="1">
+            <a:schemeClr val="accent1"/>
+          </a:lnRef>
+          <a:fillRef idx="3">
+            <a:schemeClr val="accent1"/>
+          </a:fillRef>
+          <a:effectRef idx="2">
+            <a:schemeClr val="accent1"/>
+          </a:effectRef>
+          <a:fontRef idx="minor">
+            <a:schemeClr val="lt1"/>
+          </a:fontRef>
+        </p:style>
+        <p:txBody>
+          <a:bodyPr rtlCol="0" anchor="ctr"/>
+          <a:lstStyle/>
+          <a:p>
+            <a:pPr lvl="0"/>
+            <a:endParaRPr lang="en-US" sz="1200" dirty="0" smtClean="0">
+              <a:solidFill>
+                <a:schemeClr val="tx1"/>
+              </a:solidFill>
+              <a:latin typeface="+mj-lt"/>
+              <a:cs typeface="Courier"/>
+            </a:endParaRPr>
+          </a:p>
+        </p:txBody>
+      </p:sp>
+      <p:sp>
+        <p:nvSpPr>
+          <p:cNvPr id="131" name="Rounded Rectangle 130"/>
+          <p:cNvSpPr/>
+          <p:nvPr/>
+        </p:nvSpPr>
+        <p:spPr>
+          <a:xfrm>
+            <a:off x="7332745" y="2550573"/>
+            <a:ext cx="2903050" cy="519044"/>
+          </a:xfrm>
+          <a:prstGeom prst="roundRect">
+            <a:avLst/>
+          </a:prstGeom>
+          <a:noFill/>
+          <a:ln w="28575" cmpd="sng">
+            <a:solidFill>
+              <a:srgbClr val="000000"/>
+            </a:solidFill>
+          </a:ln>
+          <a:effectLst/>
+        </p:spPr>
+        <p:style>
+          <a:lnRef idx="1">
+            <a:schemeClr val="accent1"/>
+          </a:lnRef>
+          <a:fillRef idx="3">
+            <a:schemeClr val="accent1"/>
+          </a:fillRef>
+          <a:effectRef idx="2">
+            <a:schemeClr val="accent1"/>
+          </a:effectRef>
+          <a:fontRef idx="minor">
+            <a:schemeClr val="lt1"/>
+          </a:fontRef>
+        </p:style>
+        <p:txBody>
+          <a:bodyPr rtlCol="0" anchor="ctr"/>
+          <a:lstStyle/>
+          <a:p>
+            <a:pPr lvl="0"/>
+            <a:endParaRPr lang="en-US" sz="1200" dirty="0" smtClean="0">
+              <a:solidFill>
+                <a:schemeClr val="tx1"/>
+              </a:solidFill>
+              <a:latin typeface="+mj-lt"/>
+              <a:cs typeface="Courier"/>
+            </a:endParaRPr>
+          </a:p>
+        </p:txBody>
+      </p:sp>
+      <p:sp>
+        <p:nvSpPr>
+          <p:cNvPr id="132" name="Rounded Rectangle 131"/>
+          <p:cNvSpPr/>
+          <p:nvPr/>
+        </p:nvSpPr>
+        <p:spPr>
+          <a:xfrm>
+            <a:off x="7332743" y="3358536"/>
+            <a:ext cx="2903050" cy="519044"/>
+          </a:xfrm>
+          <a:prstGeom prst="roundRect">
+            <a:avLst/>
+          </a:prstGeom>
+          <a:noFill/>
+          <a:ln w="28575" cmpd="sng">
+            <a:solidFill>
+              <a:srgbClr val="000000"/>
+            </a:solidFill>
+          </a:ln>
+          <a:effectLst/>
+        </p:spPr>
+        <p:style>
+          <a:lnRef idx="1">
+            <a:schemeClr val="accent1"/>
+          </a:lnRef>
+          <a:fillRef idx="3">
+            <a:schemeClr val="accent1"/>
+          </a:fillRef>
+          <a:effectRef idx="2">
+            <a:schemeClr val="accent1"/>
+          </a:effectRef>
+          <a:fontRef idx="minor">
+            <a:schemeClr val="lt1"/>
+          </a:fontRef>
+        </p:style>
+        <p:txBody>
+          <a:bodyPr rtlCol="0" anchor="ctr"/>
+          <a:lstStyle/>
+          <a:p>
+            <a:pPr lvl="0"/>
+            <a:endParaRPr lang="en-US" sz="1200" dirty="0" smtClean="0">
+              <a:solidFill>
+                <a:schemeClr val="tx1"/>
+              </a:solidFill>
+              <a:latin typeface="+mj-lt"/>
+              <a:cs typeface="Courier"/>
+            </a:endParaRPr>
+          </a:p>
+        </p:txBody>
+      </p:sp>
+      <p:sp>
+        <p:nvSpPr>
+          <p:cNvPr id="133" name="Rounded Rectangle 132"/>
+          <p:cNvSpPr/>
+          <p:nvPr/>
+        </p:nvSpPr>
+        <p:spPr>
+          <a:xfrm>
+            <a:off x="7332744" y="4162982"/>
+            <a:ext cx="2903050" cy="631766"/>
+          </a:xfrm>
+          <a:prstGeom prst="roundRect">
+            <a:avLst/>
+          </a:prstGeom>
+          <a:noFill/>
+          <a:ln w="28575" cmpd="sng">
+            <a:solidFill>
+              <a:srgbClr val="000000"/>
+            </a:solidFill>
+          </a:ln>
+          <a:effectLst/>
+        </p:spPr>
+        <p:style>
+          <a:lnRef idx="1">
+            <a:schemeClr val="accent1"/>
+          </a:lnRef>
+          <a:fillRef idx="3">
+            <a:schemeClr val="accent1"/>
+          </a:fillRef>
+          <a:effectRef idx="2">
+            <a:schemeClr val="accent1"/>
+          </a:effectRef>
+          <a:fontRef idx="minor">
+            <a:schemeClr val="lt1"/>
+          </a:fontRef>
+        </p:style>
+        <p:txBody>
+          <a:bodyPr rtlCol="0" anchor="ctr"/>
+          <a:lstStyle/>
+          <a:p>
+            <a:pPr lvl="0"/>
+            <a:endParaRPr lang="en-US" sz="1200" dirty="0" smtClean="0">
+              <a:solidFill>
+                <a:schemeClr val="tx1"/>
+              </a:solidFill>
+              <a:latin typeface="+mj-lt"/>
+              <a:cs typeface="Courier"/>
+            </a:endParaRPr>
+          </a:p>
+        </p:txBody>
+      </p:sp>
+      <p:cxnSp>
+        <p:nvCxnSpPr>
+          <p:cNvPr id="48" name="Elbow Connector 47"/>
+          <p:cNvCxnSpPr/>
+          <p:nvPr/>
+        </p:nvCxnSpPr>
+        <p:spPr>
+          <a:xfrm flipH="1" flipV="1">
+            <a:off x="3558512" y="3822308"/>
+            <a:ext cx="6351" cy="1123437"/>
+          </a:xfrm>
+          <a:prstGeom prst="bentConnector3">
+            <a:avLst>
+              <a:gd name="adj1" fmla="val -37898646"/>
+            </a:avLst>
+          </a:prstGeom>
+          <a:ln>
+            <a:solidFill>
+              <a:srgbClr val="FF0000"/>
+            </a:solidFill>
+            <a:tailEnd type="arrow"/>
+          </a:ln>
+          <a:effectLst/>
+        </p:spPr>
+        <p:style>
+          <a:lnRef idx="2">
+            <a:schemeClr val="accent1"/>
+          </a:lnRef>
+          <a:fillRef idx="0">
+            <a:schemeClr val="accent1"/>
+          </a:fillRef>
+          <a:effectRef idx="1">
+            <a:schemeClr val="accent1"/>
+          </a:effectRef>
+          <a:fontRef idx="minor">
+            <a:schemeClr val="tx1"/>
+          </a:fontRef>
+        </p:style>
+      </p:cxnSp>
+      <p:sp>
+        <p:nvSpPr>
+          <p:cNvPr id="49" name="Rounded Rectangle 48"/>
+          <p:cNvSpPr/>
+          <p:nvPr/>
+        </p:nvSpPr>
+        <p:spPr>
+          <a:xfrm>
+            <a:off x="350768" y="5762952"/>
+            <a:ext cx="3239496" cy="370863"/>
+          </a:xfrm>
+          <a:prstGeom prst="roundRect">
+            <a:avLst/>
+          </a:prstGeom>
+          <a:noFill/>
+          <a:ln w="28575" cmpd="sng">
+            <a:solidFill>
+              <a:srgbClr val="000000"/>
+            </a:solidFill>
+          </a:ln>
+          <a:effectLst/>
+        </p:spPr>
+        <p:style>
+          <a:lnRef idx="1">
+            <a:schemeClr val="accent1"/>
+          </a:lnRef>
+          <a:fillRef idx="3">
+            <a:schemeClr val="accent1"/>
+          </a:fillRef>
+          <a:effectRef idx="2">
+            <a:schemeClr val="accent1"/>
+          </a:effectRef>
+          <a:fontRef idx="minor">
+            <a:schemeClr val="lt1"/>
+          </a:fontRef>
+        </p:style>
+        <p:txBody>
+          <a:bodyPr rtlCol="0" anchor="ctr"/>
+          <a:lstStyle/>
+          <a:p>
+            <a:r>
+              <a:rPr lang="en-US" sz="1200" dirty="0" smtClean="0">
+                <a:solidFill>
+                  <a:srgbClr val="10253F"/>
+                </a:solidFill>
+                <a:cs typeface="Courier"/>
+              </a:rPr>
+              <a:t>a4 </a:t>
+            </a:r>
+            <a:r>
+              <a:rPr lang="en-US" sz="1200" dirty="0" smtClean="0">
+                <a:solidFill>
+                  <a:srgbClr val="10253F"/>
+                </a:solidFill>
+                <a:cs typeface="Courier"/>
+              </a:rPr>
+              <a:t>= </a:t>
+            </a:r>
+            <a:r>
+              <a:rPr lang="en-US" sz="1200" dirty="0" err="1" smtClean="0">
+                <a:solidFill>
+                  <a:srgbClr val="10253F"/>
+                </a:solidFill>
+                <a:cs typeface="Courier"/>
+              </a:rPr>
+              <a:t>compute_</a:t>
+            </a:r>
+            <a:r>
+              <a:rPr lang="en-US" sz="1200" dirty="0" err="1" smtClean="0">
+                <a:solidFill>
+                  <a:srgbClr val="10253F"/>
+                </a:solidFill>
+                <a:cs typeface="Courier"/>
+              </a:rPr>
+              <a:t>cluster_centers</a:t>
+            </a:r>
+            <a:r>
+              <a:rPr lang="en-US" sz="1200" dirty="0" smtClean="0">
+                <a:solidFill>
+                  <a:srgbClr val="10253F"/>
+                </a:solidFill>
+                <a:cs typeface="Courier"/>
+              </a:rPr>
+              <a:t>()</a:t>
+            </a:r>
+            <a:endParaRPr lang="en-US" sz="1200" dirty="0" smtClean="0">
+              <a:solidFill>
+                <a:srgbClr val="10253F"/>
+              </a:solidFill>
+              <a:cs typeface="Courier"/>
+            </a:endParaRPr>
+          </a:p>
+        </p:txBody>
+      </p:sp>
+      <p:sp>
+        <p:nvSpPr>
+          <p:cNvPr id="50" name="Rectangle 49"/>
+          <p:cNvSpPr/>
+          <p:nvPr/>
+        </p:nvSpPr>
+        <p:spPr>
+          <a:xfrm>
+            <a:off x="3688402" y="5008145"/>
+            <a:ext cx="2340605" cy="276999"/>
+          </a:xfrm>
+          <a:prstGeom prst="rect">
+            <a:avLst/>
+          </a:prstGeom>
+          <a:noFill/>
+        </p:spPr>
+        <p:txBody>
+          <a:bodyPr wrap="none">
+            <a:spAutoFit/>
+          </a:bodyPr>
+          <a:lstStyle/>
+          <a:p>
+            <a:r>
+              <a:rPr lang="en-US" sz="1200" dirty="0" smtClean="0"/>
+              <a:t>a4[’</a:t>
+            </a:r>
+            <a:r>
+              <a:rPr lang="en-US" sz="1200" dirty="0" err="1" smtClean="0"/>
+              <a:t>input_clusters</a:t>
+            </a:r>
+            <a:r>
+              <a:rPr lang="en-US" sz="1200" dirty="0" smtClean="0"/>
+              <a:t>'</a:t>
+            </a:r>
+            <a:r>
+              <a:rPr lang="en-US" sz="1200" dirty="0"/>
+              <a:t>] = </a:t>
+            </a:r>
+            <a:r>
+              <a:rPr lang="en-US" sz="1200" dirty="0" smtClean="0"/>
+              <a:t>a3[‘clusters'</a:t>
+            </a:r>
+            <a:r>
+              <a:rPr lang="en-US" sz="1200" dirty="0"/>
+              <a:t>]</a:t>
+            </a:r>
+          </a:p>
+        </p:txBody>
+      </p:sp>
+      <p:cxnSp>
+        <p:nvCxnSpPr>
+          <p:cNvPr id="51" name="Elbow Connector 50"/>
+          <p:cNvCxnSpPr/>
+          <p:nvPr/>
+        </p:nvCxnSpPr>
+        <p:spPr>
+          <a:xfrm flipH="1" flipV="1">
+            <a:off x="3542780" y="5055518"/>
+            <a:ext cx="10789" cy="797310"/>
+          </a:xfrm>
+          <a:prstGeom prst="bentConnector3">
+            <a:avLst>
+              <a:gd name="adj1" fmla="val -22235731"/>
+            </a:avLst>
+          </a:prstGeom>
+          <a:ln>
+            <a:solidFill>
+              <a:srgbClr val="FF0000"/>
+            </a:solidFill>
+            <a:tailEnd type="arrow"/>
+          </a:ln>
+          <a:effectLst/>
+        </p:spPr>
+        <p:style>
+          <a:lnRef idx="2">
+            <a:schemeClr val="accent1"/>
+          </a:lnRef>
+          <a:fillRef idx="0">
+            <a:schemeClr val="accent1"/>
+          </a:fillRef>
+          <a:effectRef idx="1">
+            <a:schemeClr val="accent1"/>
+          </a:effectRef>
+          <a:fontRef idx="minor">
+            <a:schemeClr val="tx1"/>
+          </a:fontRef>
+        </p:style>
+      </p:cxnSp>
+      <p:sp>
+        <p:nvSpPr>
+          <p:cNvPr id="57" name="Rectangle 56"/>
+          <p:cNvSpPr/>
+          <p:nvPr/>
+        </p:nvSpPr>
+        <p:spPr>
+          <a:xfrm>
+            <a:off x="3452854" y="5762952"/>
+            <a:ext cx="129149" cy="179751"/>
+          </a:xfrm>
+          <a:prstGeom prst="rect">
+            <a:avLst/>
+          </a:prstGeom>
+          <a:noFill/>
+          <a:ln>
+            <a:noFill/>
+          </a:ln>
+        </p:spPr>
+        <p:style>
+          <a:lnRef idx="1">
+            <a:schemeClr val="accent1"/>
+          </a:lnRef>
+          <a:fillRef idx="3">
+            <a:schemeClr val="accent1"/>
+          </a:fillRef>
+          <a:effectRef idx="2">
+            <a:schemeClr val="accent1"/>
+          </a:effectRef>
+          <a:fontRef idx="minor">
+            <a:schemeClr val="lt1"/>
+          </a:fontRef>
+        </p:style>
+        <p:txBody>
+          <a:bodyPr rtlCol="0" anchor="ctr"/>
+          <a:lstStyle/>
+          <a:p>
+            <a:pPr algn="ctr"/>
+            <a:endParaRPr lang="en-US"/>
+          </a:p>
+        </p:txBody>
+      </p:sp>
+      <p:sp>
+        <p:nvSpPr>
+          <p:cNvPr id="60" name="TextBox 59"/>
+          <p:cNvSpPr txBox="1"/>
+          <p:nvPr/>
+        </p:nvSpPr>
+        <p:spPr>
+          <a:xfrm>
+            <a:off x="340812" y="5455175"/>
+            <a:ext cx="3249452" cy="307777"/>
+          </a:xfrm>
+          <a:prstGeom prst="rect">
+            <a:avLst/>
+          </a:prstGeom>
+          <a:noFill/>
+        </p:spPr>
+        <p:txBody>
+          <a:bodyPr wrap="square" rtlCol="0">
+            <a:spAutoFit/>
+          </a:bodyPr>
+          <a:lstStyle/>
+          <a:p>
+            <a:r>
+              <a:rPr lang="en-US" sz="1400" b="1" dirty="0" smtClean="0"/>
+              <a:t>Compute cluster centers for the raw data</a:t>
+            </a:r>
+            <a:endParaRPr lang="en-US" sz="1400" b="1" dirty="0"/>
+          </a:p>
+        </p:txBody>
+      </p:sp>
+      <p:cxnSp>
+        <p:nvCxnSpPr>
+          <p:cNvPr id="61" name="Elbow Connector 60"/>
+          <p:cNvCxnSpPr>
+            <a:stCxn id="49" idx="3"/>
+          </p:cNvCxnSpPr>
+          <p:nvPr/>
+        </p:nvCxnSpPr>
+        <p:spPr>
+          <a:xfrm flipH="1" flipV="1">
+            <a:off x="3571214" y="1117381"/>
+            <a:ext cx="19050" cy="4831003"/>
+          </a:xfrm>
+          <a:prstGeom prst="bentConnector4">
+            <a:avLst>
+              <a:gd name="adj1" fmla="val -15827129"/>
+              <a:gd name="adj2" fmla="val 99786"/>
+            </a:avLst>
+          </a:prstGeom>
+          <a:ln>
+            <a:solidFill>
+              <a:srgbClr val="FF0000"/>
+            </a:solidFill>
+            <a:tailEnd type="arrow"/>
+          </a:ln>
+          <a:effectLst/>
+        </p:spPr>
+        <p:style>
+          <a:lnRef idx="2">
+            <a:schemeClr val="accent1"/>
+          </a:lnRef>
+          <a:fillRef idx="0">
+            <a:schemeClr val="accent1"/>
+          </a:fillRef>
+          <a:effectRef idx="1">
+            <a:schemeClr val="accent1"/>
+          </a:effectRef>
+          <a:fontRef idx="minor">
+            <a:schemeClr val="tx1"/>
+          </a:fontRef>
+        </p:style>
+      </p:cxnSp>
+      <p:sp>
+        <p:nvSpPr>
+          <p:cNvPr id="73" name="Rectangle 72"/>
+          <p:cNvSpPr/>
+          <p:nvPr/>
+        </p:nvSpPr>
+        <p:spPr>
+          <a:xfrm>
+            <a:off x="4625957" y="1089154"/>
+            <a:ext cx="2059879" cy="276999"/>
+          </a:xfrm>
+          <a:prstGeom prst="rect">
+            <a:avLst/>
+          </a:prstGeom>
+          <a:noFill/>
+        </p:spPr>
+        <p:txBody>
+          <a:bodyPr wrap="none">
+            <a:spAutoFit/>
+          </a:bodyPr>
+          <a:lstStyle/>
+          <a:p>
+            <a:r>
+              <a:rPr lang="en-US" sz="1200" dirty="0" smtClean="0"/>
+              <a:t>a4[’</a:t>
+            </a:r>
+            <a:r>
+              <a:rPr lang="en-US" sz="1200" dirty="0" err="1" smtClean="0"/>
+              <a:t>raw_data</a:t>
+            </a:r>
+            <a:r>
+              <a:rPr lang="en-US" sz="1200" dirty="0" smtClean="0"/>
+              <a:t>'</a:t>
+            </a:r>
+            <a:r>
+              <a:rPr lang="en-US" sz="1200" dirty="0" smtClean="0"/>
+              <a:t>] = a1</a:t>
+            </a:r>
+            <a:r>
+              <a:rPr lang="en-US" sz="1200" dirty="0" smtClean="0"/>
+              <a:t>[’</a:t>
+            </a:r>
+            <a:r>
+              <a:rPr lang="en-US" sz="1200" dirty="0" err="1" smtClean="0"/>
+              <a:t>msidata</a:t>
+            </a:r>
+            <a:r>
+              <a:rPr lang="en-US" sz="1200" dirty="0" smtClean="0"/>
+              <a:t>'</a:t>
+            </a:r>
+            <a:r>
+              <a:rPr lang="en-US" sz="1200" dirty="0" smtClean="0"/>
+              <a:t>]</a:t>
+            </a:r>
+            <a:endParaRPr lang="en-US" sz="1200" dirty="0"/>
+          </a:p>
+        </p:txBody>
+      </p:sp>
+    </p:spTree>
+    <p:extLst>
+      <p:ext uri="{BB962C8B-B14F-4D97-AF65-F5344CB8AC3E}">
+        <p14:creationId xmlns:p14="http://schemas.microsoft.com/office/powerpoint/2010/main" val="2413071489"/>
       </p:ext>
     </p:extLst>
   </p:cSld>

</xml_diff>